<commit_message>
#1 set PT, update
</commit_message>
<xml_diff>
--- a/프로젝트 시안 및 기획.pptx
+++ b/프로젝트 시안 및 기획.pptx
@@ -124,7 +124,7 @@
 <file path=ppt/revisionInfo.xml><?xml version="1.0" encoding="utf-8"?>
 <p1510:revInfo xmlns:a="http://schemas.openxmlformats.org/drawingml/2006/main" xmlns:r="http://schemas.openxmlformats.org/officeDocument/2006/relationships" xmlns:p1510="http://schemas.microsoft.com/office/powerpoint/2015/10/main">
   <p1510:revLst>
-    <p1510:client id="{150C3B93-C0AF-4DB5-8BBE-C6EE384AD021}" v="1520" dt="2022-04-04T22:56:32.654"/>
+    <p1510:client id="{150C3B93-C0AF-4DB5-8BBE-C6EE384AD021}" v="1541" dt="2022-04-05T00:37:33.193"/>
   </p1510:revLst>
 </p1510:revInfo>
 </file>
@@ -134,7 +134,7 @@
   <pc:docChgLst>
     <pc:chgData name="q9922000@office.skhu.ac.kr" userId="bb0c85aa-cad6-42eb-9b86-3b0dd0e2f749" providerId="ADAL" clId="{150C3B93-C0AF-4DB5-8BBE-C6EE384AD021}"/>
     <pc:docChg chg="undo redo custSel addSld delSld modSld">
-      <pc:chgData name="q9922000@office.skhu.ac.kr" userId="bb0c85aa-cad6-42eb-9b86-3b0dd0e2f749" providerId="ADAL" clId="{150C3B93-C0AF-4DB5-8BBE-C6EE384AD021}" dt="2022-04-04T22:57:27.453" v="4727" actId="1076"/>
+      <pc:chgData name="q9922000@office.skhu.ac.kr" userId="bb0c85aa-cad6-42eb-9b86-3b0dd0e2f749" providerId="ADAL" clId="{150C3B93-C0AF-4DB5-8BBE-C6EE384AD021}" dt="2022-04-05T00:37:33.193" v="4753"/>
       <pc:docMkLst>
         <pc:docMk/>
       </pc:docMkLst>
@@ -850,7 +850,7 @@
         </pc:grpChg>
       </pc:sldChg>
       <pc:sldChg chg="addSp delSp modSp mod modAnim">
-        <pc:chgData name="q9922000@office.skhu.ac.kr" userId="bb0c85aa-cad6-42eb-9b86-3b0dd0e2f749" providerId="ADAL" clId="{150C3B93-C0AF-4DB5-8BBE-C6EE384AD021}" dt="2022-04-04T21:30:31.436" v="3753"/>
+        <pc:chgData name="q9922000@office.skhu.ac.kr" userId="bb0c85aa-cad6-42eb-9b86-3b0dd0e2f749" providerId="ADAL" clId="{150C3B93-C0AF-4DB5-8BBE-C6EE384AD021}" dt="2022-04-05T00:37:00.596" v="4744"/>
         <pc:sldMkLst>
           <pc:docMk/>
           <pc:sldMk cId="1794268228" sldId="257"/>
@@ -967,6 +967,14 @@
             <ac:spMk id="56" creationId="{0D903D19-1174-42DA-9063-CD1E7C1F1D9F}"/>
           </ac:spMkLst>
         </pc:spChg>
+        <pc:spChg chg="add mod">
+          <ac:chgData name="q9922000@office.skhu.ac.kr" userId="bb0c85aa-cad6-42eb-9b86-3b0dd0e2f749" providerId="ADAL" clId="{150C3B93-C0AF-4DB5-8BBE-C6EE384AD021}" dt="2022-04-05T00:36:55.774" v="4743"/>
+          <ac:spMkLst>
+            <pc:docMk/>
+            <pc:sldMk cId="1794268228" sldId="257"/>
+            <ac:spMk id="56" creationId="{2A832FD5-D383-4AAB-931B-FE7868D61A86}"/>
+          </ac:spMkLst>
+        </pc:spChg>
         <pc:spChg chg="mod">
           <ac:chgData name="q9922000@office.skhu.ac.kr" userId="bb0c85aa-cad6-42eb-9b86-3b0dd0e2f749" providerId="ADAL" clId="{150C3B93-C0AF-4DB5-8BBE-C6EE384AD021}" dt="2022-04-04T20:56:49.234" v="3382"/>
           <ac:spMkLst>
@@ -1063,6 +1071,14 @@
             <ac:graphicFrameMk id="14" creationId="{885AE91E-633E-4CF8-A23E-9113F5F98894}"/>
           </ac:graphicFrameMkLst>
         </pc:graphicFrameChg>
+        <pc:picChg chg="add mod">
+          <ac:chgData name="q9922000@office.skhu.ac.kr" userId="bb0c85aa-cad6-42eb-9b86-3b0dd0e2f749" providerId="ADAL" clId="{150C3B93-C0AF-4DB5-8BBE-C6EE384AD021}" dt="2022-04-05T00:29:17.187" v="4728"/>
+          <ac:picMkLst>
+            <pc:docMk/>
+            <pc:sldMk cId="1794268228" sldId="257"/>
+            <ac:picMk id="7" creationId="{4B854A76-8C78-4B2E-B1C0-131CA9D21789}"/>
+          </ac:picMkLst>
+        </pc:picChg>
         <pc:picChg chg="add del mod">
           <ac:chgData name="q9922000@office.skhu.ac.kr" userId="bb0c85aa-cad6-42eb-9b86-3b0dd0e2f749" providerId="ADAL" clId="{150C3B93-C0AF-4DB5-8BBE-C6EE384AD021}" dt="2022-04-04T00:13:11.582" v="3350" actId="478"/>
           <ac:picMkLst>
@@ -1105,7 +1121,7 @@
         </pc:picChg>
       </pc:sldChg>
       <pc:sldChg chg="addSp delSp modSp mod modTransition modAnim">
-        <pc:chgData name="q9922000@office.skhu.ac.kr" userId="bb0c85aa-cad6-42eb-9b86-3b0dd0e2f749" providerId="ADAL" clId="{150C3B93-C0AF-4DB5-8BBE-C6EE384AD021}" dt="2022-04-04T21:13:34.393" v="3715"/>
+        <pc:chgData name="q9922000@office.skhu.ac.kr" userId="bb0c85aa-cad6-42eb-9b86-3b0dd0e2f749" providerId="ADAL" clId="{150C3B93-C0AF-4DB5-8BBE-C6EE384AD021}" dt="2022-04-05T00:37:09.286" v="4746"/>
         <pc:sldMkLst>
           <pc:docMk/>
           <pc:sldMk cId="2605684684" sldId="258"/>
@@ -1158,6 +1174,14 @@
             <ac:spMk id="29" creationId="{772563F2-FA01-47BC-A013-1209EEB8DCF5}"/>
           </ac:spMkLst>
         </pc:spChg>
+        <pc:spChg chg="add mod">
+          <ac:chgData name="q9922000@office.skhu.ac.kr" userId="bb0c85aa-cad6-42eb-9b86-3b0dd0e2f749" providerId="ADAL" clId="{150C3B93-C0AF-4DB5-8BBE-C6EE384AD021}" dt="2022-04-05T00:37:07.062" v="4745"/>
+          <ac:spMkLst>
+            <pc:docMk/>
+            <pc:sldMk cId="2605684684" sldId="258"/>
+            <ac:spMk id="30" creationId="{C094D38F-616A-4136-B3B3-2420E9C99CB4}"/>
+          </ac:spMkLst>
+        </pc:spChg>
         <pc:spChg chg="mod">
           <ac:chgData name="q9922000@office.skhu.ac.kr" userId="bb0c85aa-cad6-42eb-9b86-3b0dd0e2f749" providerId="ADAL" clId="{150C3B93-C0AF-4DB5-8BBE-C6EE384AD021}" dt="2022-04-04T21:13:34.393" v="3715"/>
           <ac:spMkLst>
@@ -1174,9 +1198,17 @@
             <ac:spMk id="122" creationId="{00000000-0000-0000-0000-000000000000}"/>
           </ac:spMkLst>
         </pc:spChg>
+        <pc:picChg chg="add mod">
+          <ac:chgData name="q9922000@office.skhu.ac.kr" userId="bb0c85aa-cad6-42eb-9b86-3b0dd0e2f749" providerId="ADAL" clId="{150C3B93-C0AF-4DB5-8BBE-C6EE384AD021}" dt="2022-04-05T00:29:38.699" v="4730"/>
+          <ac:picMkLst>
+            <pc:docMk/>
+            <pc:sldMk cId="2605684684" sldId="258"/>
+            <ac:picMk id="5" creationId="{864DAC80-A729-40FF-8F4F-76C372404FD7}"/>
+          </ac:picMkLst>
+        </pc:picChg>
       </pc:sldChg>
       <pc:sldChg chg="addSp delSp modSp mod delAnim modAnim">
-        <pc:chgData name="q9922000@office.skhu.ac.kr" userId="bb0c85aa-cad6-42eb-9b86-3b0dd0e2f749" providerId="ADAL" clId="{150C3B93-C0AF-4DB5-8BBE-C6EE384AD021}" dt="2022-04-04T22:28:40.740" v="4331"/>
+        <pc:chgData name="q9922000@office.skhu.ac.kr" userId="bb0c85aa-cad6-42eb-9b86-3b0dd0e2f749" providerId="ADAL" clId="{150C3B93-C0AF-4DB5-8BBE-C6EE384AD021}" dt="2022-04-05T00:36:48.789" v="4742" actId="2085"/>
         <pc:sldMkLst>
           <pc:docMk/>
           <pc:sldMk cId="2826383602" sldId="259"/>
@@ -1187,6 +1219,14 @@
             <pc:docMk/>
             <pc:sldMk cId="2826383602" sldId="259"/>
             <ac:spMk id="3" creationId="{C0071887-12A9-43B9-84A8-62712B2A4F78}"/>
+          </ac:spMkLst>
+        </pc:spChg>
+        <pc:spChg chg="add mod">
+          <ac:chgData name="q9922000@office.skhu.ac.kr" userId="bb0c85aa-cad6-42eb-9b86-3b0dd0e2f749" providerId="ADAL" clId="{150C3B93-C0AF-4DB5-8BBE-C6EE384AD021}" dt="2022-04-05T00:36:48.789" v="4742" actId="2085"/>
+          <ac:spMkLst>
+            <pc:docMk/>
+            <pc:sldMk cId="2826383602" sldId="259"/>
+            <ac:spMk id="8" creationId="{AA83146F-79E2-40DA-8471-C1615A45B00A}"/>
           </ac:spMkLst>
         </pc:spChg>
         <pc:spChg chg="add mod">
@@ -1357,9 +1397,17 @@
             <ac:grpSpMk id="56" creationId="{EE8287E2-2FFD-4604-B58B-81AAEC9E5299}"/>
           </ac:grpSpMkLst>
         </pc:grpChg>
+        <pc:picChg chg="add mod">
+          <ac:chgData name="q9922000@office.skhu.ac.kr" userId="bb0c85aa-cad6-42eb-9b86-3b0dd0e2f749" providerId="ADAL" clId="{150C3B93-C0AF-4DB5-8BBE-C6EE384AD021}" dt="2022-04-05T00:29:56.059" v="4734" actId="962"/>
+          <ac:picMkLst>
+            <pc:docMk/>
+            <pc:sldMk cId="2826383602" sldId="259"/>
+            <ac:picMk id="6" creationId="{84591647-48C9-44DA-B53D-076CFF0CFAFC}"/>
+          </ac:picMkLst>
+        </pc:picChg>
       </pc:sldChg>
       <pc:sldChg chg="addSp delSp modSp mod modAnim">
-        <pc:chgData name="q9922000@office.skhu.ac.kr" userId="bb0c85aa-cad6-42eb-9b86-3b0dd0e2f749" providerId="ADAL" clId="{150C3B93-C0AF-4DB5-8BBE-C6EE384AD021}" dt="2022-04-04T22:35:04.342" v="4446" actId="166"/>
+        <pc:chgData name="q9922000@office.skhu.ac.kr" userId="bb0c85aa-cad6-42eb-9b86-3b0dd0e2f749" providerId="ADAL" clId="{150C3B93-C0AF-4DB5-8BBE-C6EE384AD021}" dt="2022-04-05T00:37:21.943" v="4748"/>
         <pc:sldMkLst>
           <pc:docMk/>
           <pc:sldMk cId="2148042762" sldId="260"/>
@@ -1476,6 +1524,14 @@
             <ac:spMk id="74" creationId="{74D411CF-BADC-4035-BA70-A0FD585B9108}"/>
           </ac:spMkLst>
         </pc:spChg>
+        <pc:spChg chg="add mod">
+          <ac:chgData name="q9922000@office.skhu.ac.kr" userId="bb0c85aa-cad6-42eb-9b86-3b0dd0e2f749" providerId="ADAL" clId="{150C3B93-C0AF-4DB5-8BBE-C6EE384AD021}" dt="2022-04-05T00:37:17.951" v="4747"/>
+          <ac:spMkLst>
+            <pc:docMk/>
+            <pc:sldMk cId="2148042762" sldId="260"/>
+            <ac:spMk id="75" creationId="{9DD29459-F214-4FB2-B5D4-C9F9C9FAB270}"/>
+          </ac:spMkLst>
+        </pc:spChg>
         <pc:spChg chg="mod ord">
           <ac:chgData name="q9922000@office.skhu.ac.kr" userId="bb0c85aa-cad6-42eb-9b86-3b0dd0e2f749" providerId="ADAL" clId="{150C3B93-C0AF-4DB5-8BBE-C6EE384AD021}" dt="2022-04-04T22:31:48.266" v="4425" actId="1076"/>
           <ac:spMkLst>
@@ -1534,7 +1590,7 @@
         </pc:cxnChg>
       </pc:sldChg>
       <pc:sldChg chg="addSp delSp modSp mod modAnim">
-        <pc:chgData name="q9922000@office.skhu.ac.kr" userId="bb0c85aa-cad6-42eb-9b86-3b0dd0e2f749" providerId="ADAL" clId="{150C3B93-C0AF-4DB5-8BBE-C6EE384AD021}" dt="2022-04-04T22:45:23.312" v="4685" actId="166"/>
+        <pc:chgData name="q9922000@office.skhu.ac.kr" userId="bb0c85aa-cad6-42eb-9b86-3b0dd0e2f749" providerId="ADAL" clId="{150C3B93-C0AF-4DB5-8BBE-C6EE384AD021}" dt="2022-04-05T00:37:23.708" v="4749"/>
         <pc:sldMkLst>
           <pc:docMk/>
           <pc:sldMk cId="1921558748" sldId="261"/>
@@ -1665,6 +1721,14 @@
             <pc:docMk/>
             <pc:sldMk cId="1921558748" sldId="261"/>
             <ac:spMk id="72" creationId="{3293636A-121A-44E5-A4EC-AE0909105FA9}"/>
+          </ac:spMkLst>
+        </pc:spChg>
+        <pc:spChg chg="add mod">
+          <ac:chgData name="q9922000@office.skhu.ac.kr" userId="bb0c85aa-cad6-42eb-9b86-3b0dd0e2f749" providerId="ADAL" clId="{150C3B93-C0AF-4DB5-8BBE-C6EE384AD021}" dt="2022-04-05T00:37:23.708" v="4749"/>
+          <ac:spMkLst>
+            <pc:docMk/>
+            <pc:sldMk cId="1921558748" sldId="261"/>
+            <ac:spMk id="73" creationId="{8E17D4AB-013E-48D8-A505-6C79DCD90940}"/>
           </ac:spMkLst>
         </pc:spChg>
         <pc:picChg chg="del">
@@ -1812,7 +1876,7 @@
         </pc:grpChg>
       </pc:sldChg>
       <pc:sldChg chg="addSp delSp modSp mod modAnim">
-        <pc:chgData name="q9922000@office.skhu.ac.kr" userId="bb0c85aa-cad6-42eb-9b86-3b0dd0e2f749" providerId="ADAL" clId="{150C3B93-C0AF-4DB5-8BBE-C6EE384AD021}" dt="2022-04-04T21:05:30.882" v="3473"/>
+        <pc:chgData name="q9922000@office.skhu.ac.kr" userId="bb0c85aa-cad6-42eb-9b86-3b0dd0e2f749" providerId="ADAL" clId="{150C3B93-C0AF-4DB5-8BBE-C6EE384AD021}" dt="2022-04-05T00:37:27.196" v="4750"/>
         <pc:sldMkLst>
           <pc:docMk/>
           <pc:sldMk cId="533331025" sldId="263"/>
@@ -1841,9 +1905,17 @@
             <ac:spMk id="101" creationId="{889C0A5D-2A1A-4E56-920B-8502FE8D2849}"/>
           </ac:spMkLst>
         </pc:spChg>
+        <pc:spChg chg="add mod">
+          <ac:chgData name="q9922000@office.skhu.ac.kr" userId="bb0c85aa-cad6-42eb-9b86-3b0dd0e2f749" providerId="ADAL" clId="{150C3B93-C0AF-4DB5-8BBE-C6EE384AD021}" dt="2022-04-05T00:37:27.196" v="4750"/>
+          <ac:spMkLst>
+            <pc:docMk/>
+            <pc:sldMk cId="533331025" sldId="263"/>
+            <ac:spMk id="102" creationId="{5CE4D5C4-11D0-4DD5-B5F0-10DFECABA0EC}"/>
+          </ac:spMkLst>
+        </pc:spChg>
       </pc:sldChg>
       <pc:sldChg chg="addSp delSp modSp mod modAnim">
-        <pc:chgData name="q9922000@office.skhu.ac.kr" userId="bb0c85aa-cad6-42eb-9b86-3b0dd0e2f749" providerId="ADAL" clId="{150C3B93-C0AF-4DB5-8BBE-C6EE384AD021}" dt="2022-04-04T22:57:27.453" v="4727" actId="1076"/>
+        <pc:chgData name="q9922000@office.skhu.ac.kr" userId="bb0c85aa-cad6-42eb-9b86-3b0dd0e2f749" providerId="ADAL" clId="{150C3B93-C0AF-4DB5-8BBE-C6EE384AD021}" dt="2022-04-05T00:37:30.375" v="4752"/>
         <pc:sldMkLst>
           <pc:docMk/>
           <pc:sldMk cId="2711090718" sldId="266"/>
@@ -1872,6 +1944,14 @@
             <ac:spMk id="22" creationId="{A13B017E-12A9-42F3-A07B-F0A9DDD48D04}"/>
           </ac:spMkLst>
         </pc:spChg>
+        <pc:spChg chg="add mod">
+          <ac:chgData name="q9922000@office.skhu.ac.kr" userId="bb0c85aa-cad6-42eb-9b86-3b0dd0e2f749" providerId="ADAL" clId="{150C3B93-C0AF-4DB5-8BBE-C6EE384AD021}" dt="2022-04-05T00:37:28.700" v="4751"/>
+          <ac:spMkLst>
+            <pc:docMk/>
+            <pc:sldMk cId="2711090718" sldId="266"/>
+            <ac:spMk id="23" creationId="{9C591B17-3F79-4F0B-B935-E0201CC34C5A}"/>
+          </ac:spMkLst>
+        </pc:spChg>
         <pc:spChg chg="mod">
           <ac:chgData name="q9922000@office.skhu.ac.kr" userId="bb0c85aa-cad6-42eb-9b86-3b0dd0e2f749" providerId="ADAL" clId="{150C3B93-C0AF-4DB5-8BBE-C6EE384AD021}" dt="2022-04-04T22:56:44.273" v="4725" actId="14100"/>
           <ac:spMkLst>
@@ -1889,8 +1969,8 @@
           </ac:picMkLst>
         </pc:picChg>
       </pc:sldChg>
-      <pc:sldChg chg="addSp delSp modSp mod">
-        <pc:chgData name="q9922000@office.skhu.ac.kr" userId="bb0c85aa-cad6-42eb-9b86-3b0dd0e2f749" providerId="ADAL" clId="{150C3B93-C0AF-4DB5-8BBE-C6EE384AD021}" dt="2022-04-04T21:28:47.739" v="3739" actId="21"/>
+      <pc:sldChg chg="addSp delSp modSp mod modAnim">
+        <pc:chgData name="q9922000@office.skhu.ac.kr" userId="bb0c85aa-cad6-42eb-9b86-3b0dd0e2f749" providerId="ADAL" clId="{150C3B93-C0AF-4DB5-8BBE-C6EE384AD021}" dt="2022-04-05T00:37:33.193" v="4753"/>
         <pc:sldMkLst>
           <pc:docMk/>
           <pc:sldMk cId="179108529" sldId="267"/>
@@ -1909,6 +1989,14 @@
             <pc:docMk/>
             <pc:sldMk cId="179108529" sldId="267"/>
             <ac:spMk id="4" creationId="{AC63008C-0FAA-4E56-9E99-F1D0F4A31AE5}"/>
+          </ac:spMkLst>
+        </pc:spChg>
+        <pc:spChg chg="add mod">
+          <ac:chgData name="q9922000@office.skhu.ac.kr" userId="bb0c85aa-cad6-42eb-9b86-3b0dd0e2f749" providerId="ADAL" clId="{150C3B93-C0AF-4DB5-8BBE-C6EE384AD021}" dt="2022-04-05T00:37:33.193" v="4753"/>
+          <ac:spMkLst>
+            <pc:docMk/>
+            <pc:sldMk cId="179108529" sldId="267"/>
+            <ac:spMk id="6" creationId="{9467F52C-FF34-43D4-B082-5AE1D739B437}"/>
           </ac:spMkLst>
         </pc:spChg>
         <pc:picChg chg="add del mod">
@@ -15320,6 +15408,92 @@
           </a:ln>
         </p:spPr>
       </p:pic>
+      <p:pic>
+        <p:nvPicPr>
+          <p:cNvPr id="7" name="그림 6">
+            <a:extLst>
+              <a:ext uri="{FF2B5EF4-FFF2-40B4-BE49-F238E27FC236}">
+                <a16:creationId xmlns:a16="http://schemas.microsoft.com/office/drawing/2014/main" id="{4B854A76-8C78-4B2E-B1C0-131CA9D21789}"/>
+              </a:ext>
+            </a:extLst>
+          </p:cNvPr>
+          <p:cNvPicPr>
+            <a:picLocks noChangeAspect="1"/>
+          </p:cNvPicPr>
+          <p:nvPr/>
+        </p:nvPicPr>
+        <p:blipFill>
+          <a:blip r:embed="rId5">
+            <a:extLst>
+              <a:ext uri="{28A0092B-C50C-407E-A947-70E740481C1C}">
+                <a14:useLocalDpi xmlns:a14="http://schemas.microsoft.com/office/drawing/2010/main" val="0"/>
+              </a:ext>
+            </a:extLst>
+          </a:blip>
+          <a:stretch>
+            <a:fillRect/>
+          </a:stretch>
+        </p:blipFill>
+        <p:spPr>
+          <a:xfrm>
+            <a:off x="609600" y="0"/>
+            <a:ext cx="10972800" cy="6858000"/>
+          </a:xfrm>
+          <a:prstGeom prst="rect">
+            <a:avLst/>
+          </a:prstGeom>
+        </p:spPr>
+      </p:pic>
+      <p:sp>
+        <p:nvSpPr>
+          <p:cNvPr id="56" name="직사각형 55">
+            <a:extLst>
+              <a:ext uri="{FF2B5EF4-FFF2-40B4-BE49-F238E27FC236}">
+                <a16:creationId xmlns:a16="http://schemas.microsoft.com/office/drawing/2014/main" id="{2A832FD5-D383-4AAB-931B-FE7868D61A86}"/>
+              </a:ext>
+            </a:extLst>
+          </p:cNvPr>
+          <p:cNvSpPr/>
+          <p:nvPr/>
+        </p:nvSpPr>
+        <p:spPr>
+          <a:xfrm>
+            <a:off x="11702234" y="830997"/>
+            <a:ext cx="268093" cy="149764"/>
+          </a:xfrm>
+          <a:prstGeom prst="rect">
+            <a:avLst/>
+          </a:prstGeom>
+          <a:noFill/>
+          <a:ln>
+            <a:noFill/>
+          </a:ln>
+        </p:spPr>
+        <p:style>
+          <a:lnRef idx="2">
+            <a:schemeClr val="accent1">
+              <a:shade val="50000"/>
+            </a:schemeClr>
+          </a:lnRef>
+          <a:fillRef idx="1">
+            <a:schemeClr val="accent1"/>
+          </a:fillRef>
+          <a:effectRef idx="0">
+            <a:schemeClr val="accent1"/>
+          </a:effectRef>
+          <a:fontRef idx="minor">
+            <a:schemeClr val="lt1"/>
+          </a:fontRef>
+        </p:style>
+        <p:txBody>
+          <a:bodyPr rtlCol="0" anchor="ctr"/>
+          <a:lstStyle/>
+          <a:p>
+            <a:pPr algn="ctr"/>
+            <a:endParaRPr lang="ko-KR" altLang="en-US"/>
+          </a:p>
+        </p:txBody>
+      </p:sp>
     </p:spTree>
     <p:extLst>
       <p:ext uri="{BB962C8B-B14F-4D97-AF65-F5344CB8AC3E}">
@@ -15351,7 +15525,7 @@
                             </p:stCondLst>
                             <p:childTnLst>
                               <p:par>
-                                <p:cTn id="5" presetID="22" presetClass="entr" presetSubtype="8" fill="hold" grpId="0" nodeType="clickEffect">
+                                <p:cTn id="5" presetID="10" presetClass="entr" presetSubtype="0" fill="hold" grpId="0" nodeType="clickEffect">
                                   <p:stCondLst>
                                     <p:cond delay="0"/>
                                   </p:stCondLst>
@@ -15364,7 +15538,7 @@
                                           </p:stCondLst>
                                         </p:cTn>
                                         <p:tgtEl>
-                                          <p:spTgt spid="6"/>
+                                          <p:spTgt spid="56"/>
                                         </p:tgtEl>
                                         <p:attrNameLst>
                                           <p:attrName>style.visibility</p:attrName>
@@ -15374,11 +15548,11 @@
                                         <p:strVal val="visible"/>
                                       </p:to>
                                     </p:set>
-                                    <p:animEffect transition="in" filter="wipe(left)">
+                                    <p:animEffect transition="in" filter="fade">
                                       <p:cBhvr>
-                                        <p:cTn id="7" dur="500"/>
+                                        <p:cTn id="7" dur="1000"/>
                                         <p:tgtEl>
-                                          <p:spTgt spid="6"/>
+                                          <p:spTgt spid="56"/>
                                         </p:tgtEl>
                                       </p:cBhvr>
                                     </p:animEffect>
@@ -15404,7 +15578,7 @@
                             </p:stCondLst>
                             <p:childTnLst>
                               <p:par>
-                                <p:cTn id="10" presetID="10" presetClass="entr" presetSubtype="0" fill="hold" grpId="0" nodeType="clickEffect">
+                                <p:cTn id="10" presetID="22" presetClass="entr" presetSubtype="8" fill="hold" grpId="0" nodeType="clickEffect">
                                   <p:stCondLst>
                                     <p:cond delay="0"/>
                                   </p:stCondLst>
@@ -15412,6 +15586,59 @@
                                     <p:set>
                                       <p:cBhvr>
                                         <p:cTn id="11" dur="1" fill="hold">
+                                          <p:stCondLst>
+                                            <p:cond delay="0"/>
+                                          </p:stCondLst>
+                                        </p:cTn>
+                                        <p:tgtEl>
+                                          <p:spTgt spid="6"/>
+                                        </p:tgtEl>
+                                        <p:attrNameLst>
+                                          <p:attrName>style.visibility</p:attrName>
+                                        </p:attrNameLst>
+                                      </p:cBhvr>
+                                      <p:to>
+                                        <p:strVal val="visible"/>
+                                      </p:to>
+                                    </p:set>
+                                    <p:animEffect transition="in" filter="wipe(left)">
+                                      <p:cBhvr>
+                                        <p:cTn id="12" dur="500"/>
+                                        <p:tgtEl>
+                                          <p:spTgt spid="6"/>
+                                        </p:tgtEl>
+                                      </p:cBhvr>
+                                    </p:animEffect>
+                                  </p:childTnLst>
+                                </p:cTn>
+                              </p:par>
+                            </p:childTnLst>
+                          </p:cTn>
+                        </p:par>
+                      </p:childTnLst>
+                    </p:cTn>
+                  </p:par>
+                  <p:par>
+                    <p:cTn id="13" fill="hold">
+                      <p:stCondLst>
+                        <p:cond delay="indefinite"/>
+                      </p:stCondLst>
+                      <p:childTnLst>
+                        <p:par>
+                          <p:cTn id="14" fill="hold">
+                            <p:stCondLst>
+                              <p:cond delay="0"/>
+                            </p:stCondLst>
+                            <p:childTnLst>
+                              <p:par>
+                                <p:cTn id="15" presetID="10" presetClass="entr" presetSubtype="0" fill="hold" grpId="0" nodeType="clickEffect">
+                                  <p:stCondLst>
+                                    <p:cond delay="0"/>
+                                  </p:stCondLst>
+                                  <p:childTnLst>
+                                    <p:set>
+                                      <p:cBhvr>
+                                        <p:cTn id="16" dur="1" fill="hold">
                                           <p:stCondLst>
                                             <p:cond delay="0"/>
                                           </p:stCondLst>
@@ -15429,7 +15656,7 @@
                                     </p:set>
                                     <p:animEffect transition="in" filter="fade">
                                       <p:cBhvr>
-                                        <p:cTn id="12" dur="200"/>
+                                        <p:cTn id="17" dur="200"/>
                                         <p:tgtEl>
                                           <p:spTgt spid="34"/>
                                         </p:tgtEl>
@@ -15439,14 +15666,14 @@
                                 </p:cTn>
                               </p:par>
                               <p:par>
-                                <p:cTn id="13" presetID="10" presetClass="entr" presetSubtype="0" fill="hold" grpId="0" nodeType="withEffect">
+                                <p:cTn id="18" presetID="10" presetClass="entr" presetSubtype="0" fill="hold" grpId="0" nodeType="withEffect">
                                   <p:stCondLst>
                                     <p:cond delay="0"/>
                                   </p:stCondLst>
                                   <p:childTnLst>
                                     <p:set>
                                       <p:cBhvr>
-                                        <p:cTn id="14" dur="1" fill="hold">
+                                        <p:cTn id="19" dur="1" fill="hold">
                                           <p:stCondLst>
                                             <p:cond delay="0"/>
                                           </p:stCondLst>
@@ -15464,7 +15691,7 @@
                                     </p:set>
                                     <p:animEffect transition="in" filter="fade">
                                       <p:cBhvr>
-                                        <p:cTn id="15" dur="350"/>
+                                        <p:cTn id="20" dur="350"/>
                                         <p:tgtEl>
                                           <p:spTgt spid="46"/>
                                         </p:tgtEl>
@@ -15477,20 +15704,20 @@
                           </p:cTn>
                         </p:par>
                         <p:par>
-                          <p:cTn id="16" fill="hold">
+                          <p:cTn id="21" fill="hold">
                             <p:stCondLst>
                               <p:cond delay="350"/>
                             </p:stCondLst>
                             <p:childTnLst>
                               <p:par>
-                                <p:cTn id="17" presetID="22" presetClass="exit" presetSubtype="8" fill="hold" grpId="1" nodeType="afterEffect">
+                                <p:cTn id="22" presetID="22" presetClass="exit" presetSubtype="8" fill="hold" grpId="1" nodeType="afterEffect">
                                   <p:stCondLst>
                                     <p:cond delay="150"/>
                                   </p:stCondLst>
                                   <p:childTnLst>
                                     <p:animEffect transition="out" filter="wipe(left)">
                                       <p:cBhvr>
-                                        <p:cTn id="18" dur="300"/>
+                                        <p:cTn id="23" dur="300"/>
                                         <p:tgtEl>
                                           <p:spTgt spid="34"/>
                                         </p:tgtEl>
@@ -15498,7 +15725,7 @@
                                     </p:animEffect>
                                     <p:set>
                                       <p:cBhvr>
-                                        <p:cTn id="19" dur="1" fill="hold">
+                                        <p:cTn id="24" dur="1" fill="hold">
                                           <p:stCondLst>
                                             <p:cond delay="299"/>
                                           </p:stCondLst>
@@ -15524,26 +15751,26 @@
                     </p:cTn>
                   </p:par>
                   <p:par>
-                    <p:cTn id="20" fill="hold">
+                    <p:cTn id="25" fill="hold">
                       <p:stCondLst>
                         <p:cond delay="indefinite"/>
                       </p:stCondLst>
                       <p:childTnLst>
                         <p:par>
-                          <p:cTn id="21" fill="hold">
+                          <p:cTn id="26" fill="hold">
                             <p:stCondLst>
                               <p:cond delay="0"/>
                             </p:stCondLst>
                             <p:childTnLst>
                               <p:par>
-                                <p:cTn id="22" presetID="10" presetClass="entr" presetSubtype="0" fill="hold" grpId="0" nodeType="clickEffect">
+                                <p:cTn id="27" presetID="10" presetClass="entr" presetSubtype="0" fill="hold" grpId="0" nodeType="clickEffect">
                                   <p:stCondLst>
                                     <p:cond delay="0"/>
                                   </p:stCondLst>
                                   <p:childTnLst>
                                     <p:set>
                                       <p:cBhvr>
-                                        <p:cTn id="23" dur="1" fill="hold">
+                                        <p:cTn id="28" dur="1" fill="hold">
                                           <p:stCondLst>
                                             <p:cond delay="0"/>
                                           </p:stCondLst>
@@ -15561,7 +15788,7 @@
                                     </p:set>
                                     <p:animEffect transition="in" filter="fade">
                                       <p:cBhvr>
-                                        <p:cTn id="24" dur="200"/>
+                                        <p:cTn id="29" dur="200"/>
                                         <p:tgtEl>
                                           <p:spTgt spid="45"/>
                                         </p:tgtEl>
@@ -15571,14 +15798,14 @@
                                 </p:cTn>
                               </p:par>
                               <p:par>
-                                <p:cTn id="25" presetID="10" presetClass="entr" presetSubtype="0" fill="hold" grpId="0" nodeType="withEffect">
+                                <p:cTn id="30" presetID="10" presetClass="entr" presetSubtype="0" fill="hold" grpId="0" nodeType="withEffect">
                                   <p:stCondLst>
                                     <p:cond delay="0"/>
                                   </p:stCondLst>
                                   <p:childTnLst>
                                     <p:set>
                                       <p:cBhvr>
-                                        <p:cTn id="26" dur="1" fill="hold">
+                                        <p:cTn id="31" dur="1" fill="hold">
                                           <p:stCondLst>
                                             <p:cond delay="0"/>
                                           </p:stCondLst>
@@ -15596,7 +15823,7 @@
                                     </p:set>
                                     <p:animEffect transition="in" filter="fade">
                                       <p:cBhvr>
-                                        <p:cTn id="27" dur="500"/>
+                                        <p:cTn id="32" dur="500"/>
                                         <p:tgtEl>
                                           <p:spTgt spid="47"/>
                                         </p:tgtEl>
@@ -15612,26 +15839,26 @@
                     </p:cTn>
                   </p:par>
                   <p:par>
-                    <p:cTn id="28" fill="hold">
+                    <p:cTn id="33" fill="hold">
                       <p:stCondLst>
                         <p:cond delay="indefinite"/>
                       </p:stCondLst>
                       <p:childTnLst>
                         <p:par>
-                          <p:cTn id="29" fill="hold">
+                          <p:cTn id="34" fill="hold">
                             <p:stCondLst>
                               <p:cond delay="0"/>
                             </p:stCondLst>
                             <p:childTnLst>
                               <p:par>
-                                <p:cTn id="30" presetID="22" presetClass="exit" presetSubtype="8" fill="hold" grpId="1" nodeType="clickEffect">
+                                <p:cTn id="35" presetID="22" presetClass="exit" presetSubtype="8" fill="hold" grpId="1" nodeType="clickEffect">
                                   <p:stCondLst>
                                     <p:cond delay="0"/>
                                   </p:stCondLst>
                                   <p:childTnLst>
                                     <p:animEffect transition="out" filter="wipe(left)">
                                       <p:cBhvr>
-                                        <p:cTn id="31" dur="300"/>
+                                        <p:cTn id="36" dur="300"/>
                                         <p:tgtEl>
                                           <p:spTgt spid="45"/>
                                         </p:tgtEl>
@@ -15639,7 +15866,7 @@
                                     </p:animEffect>
                                     <p:set>
                                       <p:cBhvr>
-                                        <p:cTn id="32" dur="1" fill="hold">
+                                        <p:cTn id="37" dur="1" fill="hold">
                                           <p:stCondLst>
                                             <p:cond delay="299"/>
                                           </p:stCondLst>
@@ -15659,14 +15886,14 @@
                                 </p:cTn>
                               </p:par>
                               <p:par>
-                                <p:cTn id="33" presetID="1" presetClass="exit" presetSubtype="0" fill="hold" grpId="0" nodeType="withEffect">
+                                <p:cTn id="38" presetID="1" presetClass="exit" presetSubtype="0" fill="hold" grpId="0" nodeType="withEffect">
                                   <p:stCondLst>
                                     <p:cond delay="0"/>
                                   </p:stCondLst>
                                   <p:childTnLst>
                                     <p:set>
                                       <p:cBhvr>
-                                        <p:cTn id="34" dur="1" fill="hold">
+                                        <p:cTn id="39" dur="1" fill="hold">
                                           <p:stCondLst>
                                             <p:cond delay="0"/>
                                           </p:stCondLst>
@@ -15686,14 +15913,14 @@
                                 </p:cTn>
                               </p:par>
                               <p:par>
-                                <p:cTn id="35" presetID="10" presetClass="entr" presetSubtype="0" fill="hold" nodeType="withEffect">
+                                <p:cTn id="40" presetID="10" presetClass="entr" presetSubtype="0" fill="hold" nodeType="withEffect">
                                   <p:stCondLst>
                                     <p:cond delay="0"/>
                                   </p:stCondLst>
                                   <p:childTnLst>
                                     <p:set>
                                       <p:cBhvr>
-                                        <p:cTn id="36" dur="1" fill="hold">
+                                        <p:cTn id="41" dur="1" fill="hold">
                                           <p:stCondLst>
                                             <p:cond delay="0"/>
                                           </p:stCondLst>
@@ -15711,7 +15938,7 @@
                                     </p:set>
                                     <p:animEffect transition="in" filter="fade">
                                       <p:cBhvr>
-                                        <p:cTn id="37" dur="500"/>
+                                        <p:cTn id="42" dur="500"/>
                                         <p:tgtEl>
                                           <p:spTgt spid="35"/>
                                         </p:tgtEl>
@@ -15724,20 +15951,20 @@
                           </p:cTn>
                         </p:par>
                         <p:par>
-                          <p:cTn id="38" fill="hold">
+                          <p:cTn id="43" fill="hold">
                             <p:stCondLst>
                               <p:cond delay="500"/>
                             </p:stCondLst>
                             <p:childTnLst>
                               <p:par>
-                                <p:cTn id="39" presetID="22" presetClass="entr" presetSubtype="8" fill="hold" nodeType="afterEffect">
+                                <p:cTn id="44" presetID="22" presetClass="entr" presetSubtype="8" fill="hold" nodeType="afterEffect">
                                   <p:stCondLst>
                                     <p:cond delay="200"/>
                                   </p:stCondLst>
                                   <p:childTnLst>
                                     <p:set>
                                       <p:cBhvr>
-                                        <p:cTn id="40" dur="1" fill="hold">
+                                        <p:cTn id="45" dur="1" fill="hold">
                                           <p:stCondLst>
                                             <p:cond delay="0"/>
                                           </p:stCondLst>
@@ -15755,7 +15982,7 @@
                                     </p:set>
                                     <p:animEffect transition="in" filter="wipe(left)">
                                       <p:cBhvr>
-                                        <p:cTn id="41" dur="300"/>
+                                        <p:cTn id="46" dur="300"/>
                                         <p:tgtEl>
                                           <p:spTgt spid="60"/>
                                         </p:tgtEl>
@@ -15765,14 +15992,14 @@
                                 </p:cTn>
                               </p:par>
                               <p:par>
-                                <p:cTn id="42" presetID="10" presetClass="entr" presetSubtype="0" fill="hold" grpId="0" nodeType="withEffect">
+                                <p:cTn id="47" presetID="10" presetClass="entr" presetSubtype="0" fill="hold" grpId="0" nodeType="withEffect">
                                   <p:stCondLst>
                                     <p:cond delay="0"/>
                                   </p:stCondLst>
                                   <p:childTnLst>
                                     <p:set>
                                       <p:cBhvr>
-                                        <p:cTn id="43" dur="1" fill="hold">
+                                        <p:cTn id="48" dur="1" fill="hold">
                                           <p:stCondLst>
                                             <p:cond delay="0"/>
                                           </p:stCondLst>
@@ -15790,7 +16017,7 @@
                                     </p:set>
                                     <p:animEffect transition="in" filter="fade">
                                       <p:cBhvr>
-                                        <p:cTn id="44" dur="200"/>
+                                        <p:cTn id="49" dur="200"/>
                                         <p:tgtEl>
                                           <p:spTgt spid="39"/>
                                         </p:tgtEl>
@@ -15803,20 +16030,20 @@
                           </p:cTn>
                         </p:par>
                         <p:par>
-                          <p:cTn id="45" fill="hold">
+                          <p:cTn id="50" fill="hold">
                             <p:stCondLst>
                               <p:cond delay="1000"/>
                             </p:stCondLst>
                             <p:childTnLst>
                               <p:par>
-                                <p:cTn id="46" presetID="22" presetClass="exit" presetSubtype="8" fill="hold" grpId="1" nodeType="afterEffect">
+                                <p:cTn id="51" presetID="22" presetClass="exit" presetSubtype="8" fill="hold" grpId="1" nodeType="afterEffect">
                                   <p:stCondLst>
                                     <p:cond delay="150"/>
                                   </p:stCondLst>
                                   <p:childTnLst>
                                     <p:animEffect transition="out" filter="wipe(left)">
                                       <p:cBhvr>
-                                        <p:cTn id="47" dur="300"/>
+                                        <p:cTn id="52" dur="300"/>
                                         <p:tgtEl>
                                           <p:spTgt spid="39"/>
                                         </p:tgtEl>
@@ -15824,7 +16051,7 @@
                                     </p:animEffect>
                                     <p:set>
                                       <p:cBhvr>
-                                        <p:cTn id="48" dur="1" fill="hold">
+                                        <p:cTn id="53" dur="1" fill="hold">
                                           <p:stCondLst>
                                             <p:cond delay="299"/>
                                           </p:stCondLst>
@@ -15850,26 +16077,26 @@
                     </p:cTn>
                   </p:par>
                   <p:par>
-                    <p:cTn id="49" fill="hold">
+                    <p:cTn id="54" fill="hold">
                       <p:stCondLst>
                         <p:cond delay="indefinite"/>
                       </p:stCondLst>
                       <p:childTnLst>
                         <p:par>
-                          <p:cTn id="50" fill="hold">
+                          <p:cTn id="55" fill="hold">
                             <p:stCondLst>
                               <p:cond delay="0"/>
                             </p:stCondLst>
                             <p:childTnLst>
                               <p:par>
-                                <p:cTn id="51" presetID="22" presetClass="entr" presetSubtype="8" fill="hold" nodeType="clickEffect">
+                                <p:cTn id="56" presetID="22" presetClass="entr" presetSubtype="8" fill="hold" nodeType="clickEffect">
                                   <p:stCondLst>
                                     <p:cond delay="0"/>
                                   </p:stCondLst>
                                   <p:childTnLst>
                                     <p:set>
                                       <p:cBhvr>
-                                        <p:cTn id="52" dur="1" fill="hold">
+                                        <p:cTn id="57" dur="1" fill="hold">
                                           <p:stCondLst>
                                             <p:cond delay="0"/>
                                           </p:stCondLst>
@@ -15887,7 +16114,7 @@
                                     </p:set>
                                     <p:animEffect transition="in" filter="wipe(left)">
                                       <p:cBhvr>
-                                        <p:cTn id="53" dur="300"/>
+                                        <p:cTn id="58" dur="300"/>
                                         <p:tgtEl>
                                           <p:spTgt spid="59"/>
                                         </p:tgtEl>
@@ -15897,14 +16124,14 @@
                                 </p:cTn>
                               </p:par>
                               <p:par>
-                                <p:cTn id="54" presetID="10" presetClass="entr" presetSubtype="0" fill="hold" grpId="0" nodeType="withEffect">
+                                <p:cTn id="59" presetID="10" presetClass="entr" presetSubtype="0" fill="hold" grpId="0" nodeType="withEffect">
                                   <p:stCondLst>
                                     <p:cond delay="0"/>
                                   </p:stCondLst>
                                   <p:childTnLst>
                                     <p:set>
                                       <p:cBhvr>
-                                        <p:cTn id="55" dur="1" fill="hold">
+                                        <p:cTn id="60" dur="1" fill="hold">
                                           <p:stCondLst>
                                             <p:cond delay="0"/>
                                           </p:stCondLst>
@@ -15922,7 +16149,7 @@
                                     </p:set>
                                     <p:animEffect transition="in" filter="fade">
                                       <p:cBhvr>
-                                        <p:cTn id="56" dur="200"/>
+                                        <p:cTn id="61" dur="200"/>
                                         <p:tgtEl>
                                           <p:spTgt spid="40"/>
                                         </p:tgtEl>
@@ -15935,20 +16162,20 @@
                           </p:cTn>
                         </p:par>
                         <p:par>
-                          <p:cTn id="57" fill="hold">
+                          <p:cTn id="62" fill="hold">
                             <p:stCondLst>
                               <p:cond delay="300"/>
                             </p:stCondLst>
                             <p:childTnLst>
                               <p:par>
-                                <p:cTn id="58" presetID="22" presetClass="exit" presetSubtype="8" fill="hold" grpId="1" nodeType="afterEffect">
+                                <p:cTn id="63" presetID="22" presetClass="exit" presetSubtype="8" fill="hold" grpId="1" nodeType="afterEffect">
                                   <p:stCondLst>
                                     <p:cond delay="150"/>
                                   </p:stCondLst>
                                   <p:childTnLst>
                                     <p:animEffect transition="out" filter="wipe(left)">
                                       <p:cBhvr>
-                                        <p:cTn id="59" dur="300"/>
+                                        <p:cTn id="64" dur="300"/>
                                         <p:tgtEl>
                                           <p:spTgt spid="40"/>
                                         </p:tgtEl>
@@ -15956,7 +16183,7 @@
                                     </p:animEffect>
                                     <p:set>
                                       <p:cBhvr>
-                                        <p:cTn id="60" dur="1" fill="hold">
+                                        <p:cTn id="65" dur="1" fill="hold">
                                           <p:stCondLst>
                                             <p:cond delay="299"/>
                                           </p:stCondLst>
@@ -15982,26 +16209,26 @@
                     </p:cTn>
                   </p:par>
                   <p:par>
-                    <p:cTn id="61" fill="hold">
+                    <p:cTn id="66" fill="hold">
                       <p:stCondLst>
                         <p:cond delay="indefinite"/>
                       </p:stCondLst>
                       <p:childTnLst>
                         <p:par>
-                          <p:cTn id="62" fill="hold">
+                          <p:cTn id="67" fill="hold">
                             <p:stCondLst>
                               <p:cond delay="0"/>
                             </p:stCondLst>
                             <p:childTnLst>
                               <p:par>
-                                <p:cTn id="63" presetID="10" presetClass="entr" presetSubtype="0" fill="hold" grpId="0" nodeType="clickEffect">
+                                <p:cTn id="68" presetID="10" presetClass="entr" presetSubtype="0" fill="hold" grpId="0" nodeType="clickEffect">
                                   <p:stCondLst>
                                     <p:cond delay="0"/>
                                   </p:stCondLst>
                                   <p:childTnLst>
                                     <p:set>
                                       <p:cBhvr>
-                                        <p:cTn id="64" dur="1" fill="hold">
+                                        <p:cTn id="69" dur="1" fill="hold">
                                           <p:stCondLst>
                                             <p:cond delay="0"/>
                                           </p:stCondLst>
@@ -16019,7 +16246,7 @@
                                     </p:set>
                                     <p:animEffect transition="in" filter="fade">
                                       <p:cBhvr>
-                                        <p:cTn id="65" dur="200"/>
+                                        <p:cTn id="70" dur="200"/>
                                         <p:tgtEl>
                                           <p:spTgt spid="41"/>
                                         </p:tgtEl>
@@ -16029,14 +16256,14 @@
                                 </p:cTn>
                               </p:par>
                               <p:par>
-                                <p:cTn id="66" presetID="10" presetClass="entr" presetSubtype="0" fill="hold" grpId="0" nodeType="withEffect">
+                                <p:cTn id="71" presetID="10" presetClass="entr" presetSubtype="0" fill="hold" grpId="0" nodeType="withEffect">
                                   <p:stCondLst>
                                     <p:cond delay="0"/>
                                   </p:stCondLst>
                                   <p:childTnLst>
                                     <p:set>
                                       <p:cBhvr>
-                                        <p:cTn id="67" dur="1" fill="hold">
+                                        <p:cTn id="72" dur="1" fill="hold">
                                           <p:stCondLst>
                                             <p:cond delay="0"/>
                                           </p:stCondLst>
@@ -16054,7 +16281,7 @@
                                     </p:set>
                                     <p:animEffect transition="in" filter="fade">
                                       <p:cBhvr>
-                                        <p:cTn id="68" dur="500"/>
+                                        <p:cTn id="73" dur="500"/>
                                         <p:tgtEl>
                                           <p:spTgt spid="50"/>
                                         </p:tgtEl>
@@ -16067,20 +16294,20 @@
                           </p:cTn>
                         </p:par>
                         <p:par>
-                          <p:cTn id="69" fill="hold">
+                          <p:cTn id="74" fill="hold">
                             <p:stCondLst>
                               <p:cond delay="500"/>
                             </p:stCondLst>
                             <p:childTnLst>
                               <p:par>
-                                <p:cTn id="70" presetID="22" presetClass="exit" presetSubtype="8" fill="hold" grpId="1" nodeType="afterEffect">
+                                <p:cTn id="75" presetID="22" presetClass="exit" presetSubtype="8" fill="hold" grpId="1" nodeType="afterEffect">
                                   <p:stCondLst>
                                     <p:cond delay="150"/>
                                   </p:stCondLst>
                                   <p:childTnLst>
                                     <p:animEffect transition="out" filter="wipe(left)">
                                       <p:cBhvr>
-                                        <p:cTn id="71" dur="300"/>
+                                        <p:cTn id="76" dur="300"/>
                                         <p:tgtEl>
                                           <p:spTgt spid="41"/>
                                         </p:tgtEl>
@@ -16088,7 +16315,7 @@
                                     </p:animEffect>
                                     <p:set>
                                       <p:cBhvr>
-                                        <p:cTn id="72" dur="1" fill="hold">
+                                        <p:cTn id="77" dur="1" fill="hold">
                                           <p:stCondLst>
                                             <p:cond delay="299"/>
                                           </p:stCondLst>
@@ -16114,26 +16341,26 @@
                     </p:cTn>
                   </p:par>
                   <p:par>
-                    <p:cTn id="73" fill="hold">
+                    <p:cTn id="78" fill="hold">
                       <p:stCondLst>
                         <p:cond delay="indefinite"/>
                       </p:stCondLst>
                       <p:childTnLst>
                         <p:par>
-                          <p:cTn id="74" fill="hold">
+                          <p:cTn id="79" fill="hold">
                             <p:stCondLst>
                               <p:cond delay="0"/>
                             </p:stCondLst>
                             <p:childTnLst>
                               <p:par>
-                                <p:cTn id="75" presetID="10" presetClass="entr" presetSubtype="0" fill="hold" grpId="0" nodeType="clickEffect">
+                                <p:cTn id="80" presetID="10" presetClass="entr" presetSubtype="0" fill="hold" grpId="0" nodeType="clickEffect">
                                   <p:stCondLst>
                                     <p:cond delay="0"/>
                                   </p:stCondLst>
                                   <p:childTnLst>
                                     <p:set>
                                       <p:cBhvr>
-                                        <p:cTn id="76" dur="1" fill="hold">
+                                        <p:cTn id="81" dur="1" fill="hold">
                                           <p:stCondLst>
                                             <p:cond delay="0"/>
                                           </p:stCondLst>
@@ -16151,7 +16378,7 @@
                                     </p:set>
                                     <p:animEffect transition="in" filter="fade">
                                       <p:cBhvr>
-                                        <p:cTn id="77" dur="200"/>
+                                        <p:cTn id="82" dur="200"/>
                                         <p:tgtEl>
                                           <p:spTgt spid="42"/>
                                         </p:tgtEl>
@@ -16161,14 +16388,14 @@
                                 </p:cTn>
                               </p:par>
                               <p:par>
-                                <p:cTn id="78" presetID="10" presetClass="entr" presetSubtype="0" fill="hold" grpId="0" nodeType="withEffect">
+                                <p:cTn id="83" presetID="10" presetClass="entr" presetSubtype="0" fill="hold" grpId="0" nodeType="withEffect">
                                   <p:stCondLst>
                                     <p:cond delay="0"/>
                                   </p:stCondLst>
                                   <p:childTnLst>
                                     <p:set>
                                       <p:cBhvr>
-                                        <p:cTn id="79" dur="1" fill="hold">
+                                        <p:cTn id="84" dur="1" fill="hold">
                                           <p:stCondLst>
                                             <p:cond delay="0"/>
                                           </p:stCondLst>
@@ -16186,7 +16413,7 @@
                                     </p:set>
                                     <p:animEffect transition="in" filter="fade">
                                       <p:cBhvr>
-                                        <p:cTn id="80" dur="500"/>
+                                        <p:cTn id="85" dur="500"/>
                                         <p:tgtEl>
                                           <p:spTgt spid="51"/>
                                         </p:tgtEl>
@@ -16199,20 +16426,20 @@
                           </p:cTn>
                         </p:par>
                         <p:par>
-                          <p:cTn id="81" fill="hold">
+                          <p:cTn id="86" fill="hold">
                             <p:stCondLst>
                               <p:cond delay="500"/>
                             </p:stCondLst>
                             <p:childTnLst>
                               <p:par>
-                                <p:cTn id="82" presetID="22" presetClass="exit" presetSubtype="8" fill="hold" grpId="1" nodeType="afterEffect">
+                                <p:cTn id="87" presetID="22" presetClass="exit" presetSubtype="8" fill="hold" grpId="1" nodeType="afterEffect">
                                   <p:stCondLst>
                                     <p:cond delay="150"/>
                                   </p:stCondLst>
                                   <p:childTnLst>
                                     <p:animEffect transition="out" filter="wipe(left)">
                                       <p:cBhvr>
-                                        <p:cTn id="83" dur="300"/>
+                                        <p:cTn id="88" dur="300"/>
                                         <p:tgtEl>
                                           <p:spTgt spid="42"/>
                                         </p:tgtEl>
@@ -16220,7 +16447,7 @@
                                     </p:animEffect>
                                     <p:set>
                                       <p:cBhvr>
-                                        <p:cTn id="84" dur="1" fill="hold">
+                                        <p:cTn id="89" dur="1" fill="hold">
                                           <p:stCondLst>
                                             <p:cond delay="299"/>
                                           </p:stCondLst>
@@ -16246,26 +16473,26 @@
                     </p:cTn>
                   </p:par>
                   <p:par>
-                    <p:cTn id="85" fill="hold">
+                    <p:cTn id="90" fill="hold">
                       <p:stCondLst>
                         <p:cond delay="indefinite"/>
                       </p:stCondLst>
                       <p:childTnLst>
                         <p:par>
-                          <p:cTn id="86" fill="hold">
+                          <p:cTn id="91" fill="hold">
                             <p:stCondLst>
                               <p:cond delay="0"/>
                             </p:stCondLst>
                             <p:childTnLst>
                               <p:par>
-                                <p:cTn id="87" presetID="10" presetClass="entr" presetSubtype="0" fill="hold" grpId="0" nodeType="clickEffect">
+                                <p:cTn id="92" presetID="10" presetClass="entr" presetSubtype="0" fill="hold" grpId="0" nodeType="clickEffect">
                                   <p:stCondLst>
                                     <p:cond delay="0"/>
                                   </p:stCondLst>
                                   <p:childTnLst>
                                     <p:set>
                                       <p:cBhvr>
-                                        <p:cTn id="88" dur="1" fill="hold">
+                                        <p:cTn id="93" dur="1" fill="hold">
                                           <p:stCondLst>
                                             <p:cond delay="0"/>
                                           </p:stCondLst>
@@ -16283,7 +16510,7 @@
                                     </p:set>
                                     <p:animEffect transition="in" filter="fade">
                                       <p:cBhvr>
-                                        <p:cTn id="89" dur="200"/>
+                                        <p:cTn id="94" dur="200"/>
                                         <p:tgtEl>
                                           <p:spTgt spid="43"/>
                                         </p:tgtEl>
@@ -16293,14 +16520,14 @@
                                 </p:cTn>
                               </p:par>
                               <p:par>
-                                <p:cTn id="90" presetID="10" presetClass="entr" presetSubtype="0" fill="hold" grpId="0" nodeType="withEffect">
+                                <p:cTn id="95" presetID="10" presetClass="entr" presetSubtype="0" fill="hold" grpId="0" nodeType="withEffect">
                                   <p:stCondLst>
                                     <p:cond delay="0"/>
                                   </p:stCondLst>
                                   <p:childTnLst>
                                     <p:set>
                                       <p:cBhvr>
-                                        <p:cTn id="91" dur="1" fill="hold">
+                                        <p:cTn id="96" dur="1" fill="hold">
                                           <p:stCondLst>
                                             <p:cond delay="0"/>
                                           </p:stCondLst>
@@ -16318,7 +16545,7 @@
                                     </p:set>
                                     <p:animEffect transition="in" filter="fade">
                                       <p:cBhvr>
-                                        <p:cTn id="92" dur="500"/>
+                                        <p:cTn id="97" dur="500"/>
                                         <p:tgtEl>
                                           <p:spTgt spid="52"/>
                                         </p:tgtEl>
@@ -16331,20 +16558,20 @@
                           </p:cTn>
                         </p:par>
                         <p:par>
-                          <p:cTn id="93" fill="hold">
+                          <p:cTn id="98" fill="hold">
                             <p:stCondLst>
                               <p:cond delay="500"/>
                             </p:stCondLst>
                             <p:childTnLst>
                               <p:par>
-                                <p:cTn id="94" presetID="22" presetClass="exit" presetSubtype="8" fill="hold" grpId="1" nodeType="afterEffect">
+                                <p:cTn id="99" presetID="22" presetClass="exit" presetSubtype="8" fill="hold" grpId="1" nodeType="afterEffect">
                                   <p:stCondLst>
                                     <p:cond delay="150"/>
                                   </p:stCondLst>
                                   <p:childTnLst>
                                     <p:animEffect transition="out" filter="wipe(left)">
                                       <p:cBhvr>
-                                        <p:cTn id="95" dur="300"/>
+                                        <p:cTn id="100" dur="300"/>
                                         <p:tgtEl>
                                           <p:spTgt spid="43"/>
                                         </p:tgtEl>
@@ -16352,7 +16579,7 @@
                                     </p:animEffect>
                                     <p:set>
                                       <p:cBhvr>
-                                        <p:cTn id="96" dur="1" fill="hold">
+                                        <p:cTn id="101" dur="1" fill="hold">
                                           <p:stCondLst>
                                             <p:cond delay="299"/>
                                           </p:stCondLst>
@@ -16378,26 +16605,26 @@
                     </p:cTn>
                   </p:par>
                   <p:par>
-                    <p:cTn id="97" fill="hold">
+                    <p:cTn id="102" fill="hold">
                       <p:stCondLst>
                         <p:cond delay="indefinite"/>
                       </p:stCondLst>
                       <p:childTnLst>
                         <p:par>
-                          <p:cTn id="98" fill="hold">
+                          <p:cTn id="103" fill="hold">
                             <p:stCondLst>
                               <p:cond delay="0"/>
                             </p:stCondLst>
                             <p:childTnLst>
                               <p:par>
-                                <p:cTn id="99" presetID="10" presetClass="entr" presetSubtype="0" fill="hold" nodeType="clickEffect">
+                                <p:cTn id="104" presetID="10" presetClass="entr" presetSubtype="0" fill="hold" nodeType="clickEffect">
                                   <p:stCondLst>
                                     <p:cond delay="0"/>
                                   </p:stCondLst>
                                   <p:childTnLst>
                                     <p:set>
                                       <p:cBhvr>
-                                        <p:cTn id="100" dur="1" fill="hold">
+                                        <p:cTn id="105" dur="1" fill="hold">
                                           <p:stCondLst>
                                             <p:cond delay="0"/>
                                           </p:stCondLst>
@@ -16415,7 +16642,7 @@
                                     </p:set>
                                     <p:animEffect transition="in" filter="fade">
                                       <p:cBhvr>
-                                        <p:cTn id="101" dur="200"/>
+                                        <p:cTn id="106" dur="200"/>
                                         <p:tgtEl>
                                           <p:spTgt spid="53"/>
                                         </p:tgtEl>
@@ -16431,26 +16658,26 @@
                     </p:cTn>
                   </p:par>
                   <p:par>
-                    <p:cTn id="102" fill="hold">
+                    <p:cTn id="107" fill="hold">
                       <p:stCondLst>
                         <p:cond delay="indefinite"/>
                       </p:stCondLst>
                       <p:childTnLst>
                         <p:par>
-                          <p:cTn id="103" fill="hold">
+                          <p:cTn id="108" fill="hold">
                             <p:stCondLst>
                               <p:cond delay="0"/>
                             </p:stCondLst>
                             <p:childTnLst>
                               <p:par>
-                                <p:cTn id="104" presetID="10" presetClass="exit" presetSubtype="0" fill="hold" grpId="1" nodeType="clickEffect">
+                                <p:cTn id="109" presetID="10" presetClass="exit" presetSubtype="0" fill="hold" grpId="1" nodeType="clickEffect">
                                   <p:stCondLst>
                                     <p:cond delay="0"/>
                                   </p:stCondLst>
                                   <p:childTnLst>
                                     <p:animEffect transition="out" filter="fade">
                                       <p:cBhvr>
-                                        <p:cTn id="105" dur="150"/>
+                                        <p:cTn id="110" dur="150"/>
                                         <p:tgtEl>
                                           <p:spTgt spid="46"/>
                                         </p:tgtEl>
@@ -16458,7 +16685,7 @@
                                     </p:animEffect>
                                     <p:set>
                                       <p:cBhvr>
-                                        <p:cTn id="106" dur="1" fill="hold">
+                                        <p:cTn id="111" dur="1" fill="hold">
                                           <p:stCondLst>
                                             <p:cond delay="149"/>
                                           </p:stCondLst>
@@ -16478,14 +16705,14 @@
                                 </p:cTn>
                               </p:par>
                               <p:par>
-                                <p:cTn id="107" presetID="10" presetClass="exit" presetSubtype="0" fill="hold" grpId="1" nodeType="withEffect">
+                                <p:cTn id="112" presetID="10" presetClass="exit" presetSubtype="0" fill="hold" grpId="1" nodeType="withEffect">
                                   <p:stCondLst>
                                     <p:cond delay="0"/>
                                   </p:stCondLst>
                                   <p:childTnLst>
                                     <p:animEffect transition="out" filter="fade">
                                       <p:cBhvr>
-                                        <p:cTn id="108" dur="150"/>
+                                        <p:cTn id="113" dur="150"/>
                                         <p:tgtEl>
                                           <p:spTgt spid="47"/>
                                         </p:tgtEl>
@@ -16493,7 +16720,7 @@
                                     </p:animEffect>
                                     <p:set>
                                       <p:cBhvr>
-                                        <p:cTn id="109" dur="1" fill="hold">
+                                        <p:cTn id="114" dur="1" fill="hold">
                                           <p:stCondLst>
                                             <p:cond delay="149"/>
                                           </p:stCondLst>
@@ -16513,14 +16740,14 @@
                                 </p:cTn>
                               </p:par>
                               <p:par>
-                                <p:cTn id="110" presetID="10" presetClass="exit" presetSubtype="0" fill="hold" nodeType="withEffect">
+                                <p:cTn id="115" presetID="10" presetClass="exit" presetSubtype="0" fill="hold" nodeType="withEffect">
                                   <p:stCondLst>
                                     <p:cond delay="0"/>
                                   </p:stCondLst>
                                   <p:childTnLst>
                                     <p:animEffect transition="out" filter="fade">
                                       <p:cBhvr>
-                                        <p:cTn id="111" dur="150"/>
+                                        <p:cTn id="116" dur="150"/>
                                         <p:tgtEl>
                                           <p:spTgt spid="60"/>
                                         </p:tgtEl>
@@ -16528,7 +16755,7 @@
                                     </p:animEffect>
                                     <p:set>
                                       <p:cBhvr>
-                                        <p:cTn id="112" dur="1" fill="hold">
+                                        <p:cTn id="117" dur="1" fill="hold">
                                           <p:stCondLst>
                                             <p:cond delay="149"/>
                                           </p:stCondLst>
@@ -16548,14 +16775,14 @@
                                 </p:cTn>
                               </p:par>
                               <p:par>
-                                <p:cTn id="113" presetID="10" presetClass="exit" presetSubtype="0" fill="hold" nodeType="withEffect">
+                                <p:cTn id="118" presetID="10" presetClass="exit" presetSubtype="0" fill="hold" nodeType="withEffect">
                                   <p:stCondLst>
                                     <p:cond delay="0"/>
                                   </p:stCondLst>
                                   <p:childTnLst>
                                     <p:animEffect transition="out" filter="fade">
                                       <p:cBhvr>
-                                        <p:cTn id="114" dur="150"/>
+                                        <p:cTn id="119" dur="150"/>
                                         <p:tgtEl>
                                           <p:spTgt spid="59"/>
                                         </p:tgtEl>
@@ -16563,7 +16790,7 @@
                                     </p:animEffect>
                                     <p:set>
                                       <p:cBhvr>
-                                        <p:cTn id="115" dur="1" fill="hold">
+                                        <p:cTn id="120" dur="1" fill="hold">
                                           <p:stCondLst>
                                             <p:cond delay="149"/>
                                           </p:stCondLst>
@@ -16583,14 +16810,14 @@
                                 </p:cTn>
                               </p:par>
                               <p:par>
-                                <p:cTn id="116" presetID="10" presetClass="exit" presetSubtype="0" fill="hold" grpId="1" nodeType="withEffect">
+                                <p:cTn id="121" presetID="10" presetClass="exit" presetSubtype="0" fill="hold" grpId="1" nodeType="withEffect">
                                   <p:stCondLst>
                                     <p:cond delay="0"/>
                                   </p:stCondLst>
                                   <p:childTnLst>
                                     <p:animEffect transition="out" filter="fade">
                                       <p:cBhvr>
-                                        <p:cTn id="117" dur="150"/>
+                                        <p:cTn id="122" dur="150"/>
                                         <p:tgtEl>
                                           <p:spTgt spid="50"/>
                                         </p:tgtEl>
@@ -16598,7 +16825,7 @@
                                     </p:animEffect>
                                     <p:set>
                                       <p:cBhvr>
-                                        <p:cTn id="118" dur="1" fill="hold">
+                                        <p:cTn id="123" dur="1" fill="hold">
                                           <p:stCondLst>
                                             <p:cond delay="149"/>
                                           </p:stCondLst>
@@ -16618,14 +16845,14 @@
                                 </p:cTn>
                               </p:par>
                               <p:par>
-                                <p:cTn id="119" presetID="10" presetClass="exit" presetSubtype="0" fill="hold" grpId="1" nodeType="withEffect">
+                                <p:cTn id="124" presetID="10" presetClass="exit" presetSubtype="0" fill="hold" grpId="1" nodeType="withEffect">
                                   <p:stCondLst>
                                     <p:cond delay="0"/>
                                   </p:stCondLst>
                                   <p:childTnLst>
                                     <p:animEffect transition="out" filter="fade">
                                       <p:cBhvr>
-                                        <p:cTn id="120" dur="150"/>
+                                        <p:cTn id="125" dur="150"/>
                                         <p:tgtEl>
                                           <p:spTgt spid="51"/>
                                         </p:tgtEl>
@@ -16633,7 +16860,7 @@
                                     </p:animEffect>
                                     <p:set>
                                       <p:cBhvr>
-                                        <p:cTn id="121" dur="1" fill="hold">
+                                        <p:cTn id="126" dur="1" fill="hold">
                                           <p:stCondLst>
                                             <p:cond delay="149"/>
                                           </p:stCondLst>
@@ -16653,14 +16880,14 @@
                                 </p:cTn>
                               </p:par>
                               <p:par>
-                                <p:cTn id="122" presetID="10" presetClass="exit" presetSubtype="0" fill="hold" grpId="1" nodeType="withEffect">
+                                <p:cTn id="127" presetID="10" presetClass="exit" presetSubtype="0" fill="hold" grpId="1" nodeType="withEffect">
                                   <p:stCondLst>
                                     <p:cond delay="0"/>
                                   </p:stCondLst>
                                   <p:childTnLst>
                                     <p:animEffect transition="out" filter="fade">
                                       <p:cBhvr>
-                                        <p:cTn id="123" dur="150"/>
+                                        <p:cTn id="128" dur="150"/>
                                         <p:tgtEl>
                                           <p:spTgt spid="52"/>
                                         </p:tgtEl>
@@ -16668,7 +16895,7 @@
                                     </p:animEffect>
                                     <p:set>
                                       <p:cBhvr>
-                                        <p:cTn id="124" dur="1" fill="hold">
+                                        <p:cTn id="129" dur="1" fill="hold">
                                           <p:stCondLst>
                                             <p:cond delay="149"/>
                                           </p:stCondLst>
@@ -16688,14 +16915,14 @@
                                 </p:cTn>
                               </p:par>
                               <p:par>
-                                <p:cTn id="125" presetID="22" presetClass="exit" presetSubtype="8" fill="hold" grpId="1" nodeType="withEffect">
+                                <p:cTn id="130" presetID="22" presetClass="exit" presetSubtype="8" fill="hold" grpId="1" nodeType="withEffect">
                                   <p:stCondLst>
                                     <p:cond delay="0"/>
                                   </p:stCondLst>
                                   <p:childTnLst>
                                     <p:animEffect transition="out" filter="wipe(left)">
                                       <p:cBhvr>
-                                        <p:cTn id="126" dur="150"/>
+                                        <p:cTn id="131" dur="150"/>
                                         <p:tgtEl>
                                           <p:spTgt spid="6"/>
                                         </p:tgtEl>
@@ -16703,7 +16930,7 @@
                                     </p:animEffect>
                                     <p:set>
                                       <p:cBhvr>
-                                        <p:cTn id="127" dur="1" fill="hold">
+                                        <p:cTn id="132" dur="1" fill="hold">
                                           <p:stCondLst>
                                             <p:cond delay="149"/>
                                           </p:stCondLst>
@@ -16723,14 +16950,14 @@
                                 </p:cTn>
                               </p:par>
                               <p:par>
-                                <p:cTn id="128" presetID="10" presetClass="exit" presetSubtype="0" fill="hold" nodeType="withEffect">
+                                <p:cTn id="133" presetID="10" presetClass="exit" presetSubtype="0" fill="hold" nodeType="withEffect">
                                   <p:stCondLst>
                                     <p:cond delay="0"/>
                                   </p:stCondLst>
                                   <p:childTnLst>
                                     <p:animEffect transition="out" filter="fade">
                                       <p:cBhvr>
-                                        <p:cTn id="129" dur="150"/>
+                                        <p:cTn id="134" dur="150"/>
                                         <p:tgtEl>
                                           <p:spTgt spid="53"/>
                                         </p:tgtEl>
@@ -16738,7 +16965,7 @@
                                     </p:animEffect>
                                     <p:set>
                                       <p:cBhvr>
-                                        <p:cTn id="130" dur="1" fill="hold">
+                                        <p:cTn id="135" dur="1" fill="hold">
                                           <p:stCondLst>
                                             <p:cond delay="149"/>
                                           </p:stCondLst>
@@ -16764,26 +16991,26 @@
                     </p:cTn>
                   </p:par>
                   <p:par>
-                    <p:cTn id="131" fill="hold">
+                    <p:cTn id="136" fill="hold">
                       <p:stCondLst>
                         <p:cond delay="indefinite"/>
                       </p:stCondLst>
                       <p:childTnLst>
                         <p:par>
-                          <p:cTn id="132" fill="hold">
+                          <p:cTn id="137" fill="hold">
                             <p:stCondLst>
                               <p:cond delay="0"/>
                             </p:stCondLst>
                             <p:childTnLst>
                               <p:par>
-                                <p:cTn id="133" presetID="10" presetClass="entr" presetSubtype="0" fill="hold" grpId="0" nodeType="clickEffect">
+                                <p:cTn id="138" presetID="10" presetClass="entr" presetSubtype="0" fill="hold" grpId="0" nodeType="clickEffect">
                                   <p:stCondLst>
                                     <p:cond delay="0"/>
                                   </p:stCondLst>
                                   <p:childTnLst>
                                     <p:set>
                                       <p:cBhvr>
-                                        <p:cTn id="134" dur="1" fill="hold">
+                                        <p:cTn id="139" dur="1" fill="hold">
                                           <p:stCondLst>
                                             <p:cond delay="0"/>
                                           </p:stCondLst>
@@ -16801,7 +17028,7 @@
                                     </p:set>
                                     <p:animEffect transition="in" filter="fade">
                                       <p:cBhvr>
-                                        <p:cTn id="135" dur="500"/>
+                                        <p:cTn id="140" dur="500"/>
                                         <p:tgtEl>
                                           <p:spTgt spid="21"/>
                                         </p:tgtEl>
@@ -16811,14 +17038,14 @@
                                 </p:cTn>
                               </p:par>
                               <p:par>
-                                <p:cTn id="136" presetID="10" presetClass="entr" presetSubtype="0" fill="hold" grpId="0" nodeType="withEffect">
+                                <p:cTn id="141" presetID="10" presetClass="entr" presetSubtype="0" fill="hold" grpId="0" nodeType="withEffect">
                                   <p:stCondLst>
                                     <p:cond delay="0"/>
                                   </p:stCondLst>
                                   <p:childTnLst>
                                     <p:set>
                                       <p:cBhvr>
-                                        <p:cTn id="137" dur="1" fill="hold">
+                                        <p:cTn id="142" dur="1" fill="hold">
                                           <p:stCondLst>
                                             <p:cond delay="0"/>
                                           </p:stCondLst>
@@ -16836,7 +17063,7 @@
                                     </p:set>
                                     <p:animEffect transition="in" filter="fade">
                                       <p:cBhvr>
-                                        <p:cTn id="138" dur="500"/>
+                                        <p:cTn id="143" dur="500"/>
                                         <p:tgtEl>
                                           <p:spTgt spid="3"/>
                                         </p:tgtEl>
@@ -16852,26 +17079,26 @@
                     </p:cTn>
                   </p:par>
                   <p:par>
-                    <p:cTn id="139" fill="hold">
+                    <p:cTn id="144" fill="hold">
                       <p:stCondLst>
                         <p:cond delay="indefinite"/>
                       </p:stCondLst>
                       <p:childTnLst>
                         <p:par>
-                          <p:cTn id="140" fill="hold">
+                          <p:cTn id="145" fill="hold">
                             <p:stCondLst>
                               <p:cond delay="0"/>
                             </p:stCondLst>
                             <p:childTnLst>
                               <p:par>
-                                <p:cTn id="141" presetID="42" presetClass="path" presetSubtype="0" accel="50000" decel="50000" fill="hold" grpId="1" nodeType="clickEffect">
+                                <p:cTn id="146" presetID="42" presetClass="path" presetSubtype="0" accel="50000" decel="50000" fill="hold" grpId="1" nodeType="clickEffect">
                                   <p:stCondLst>
                                     <p:cond delay="0"/>
                                   </p:stCondLst>
                                   <p:childTnLst>
                                     <p:animMotion origin="layout" path="M 4.58333E-6 -4.81481E-6 L -0.43842 0.32061 " pathEditMode="relative" rAng="0" ptsTypes="AA">
                                       <p:cBhvr>
-                                        <p:cTn id="142" dur="800" fill="hold"/>
+                                        <p:cTn id="147" dur="800" fill="hold"/>
                                         <p:tgtEl>
                                           <p:spTgt spid="3"/>
                                         </p:tgtEl>
@@ -16886,14 +17113,14 @@
                                 </p:cTn>
                               </p:par>
                               <p:par>
-                                <p:cTn id="143" presetID="6" presetClass="emph" presetSubtype="0" fill="hold" grpId="2" nodeType="withEffect">
+                                <p:cTn id="148" presetID="6" presetClass="emph" presetSubtype="0" fill="hold" grpId="2" nodeType="withEffect">
                                   <p:stCondLst>
                                     <p:cond delay="0"/>
                                   </p:stCondLst>
                                   <p:childTnLst>
                                     <p:animScale>
                                       <p:cBhvr>
-                                        <p:cTn id="144" dur="600" fill="hold"/>
+                                        <p:cTn id="149" dur="600" fill="hold"/>
                                         <p:tgtEl>
                                           <p:spTgt spid="3"/>
                                         </p:tgtEl>
@@ -16904,14 +17131,14 @@
                                 </p:cTn>
                               </p:par>
                               <p:par>
-                                <p:cTn id="145" presetID="42" presetClass="path" presetSubtype="0" accel="50000" decel="50000" fill="hold" grpId="0" nodeType="withEffect">
+                                <p:cTn id="150" presetID="42" presetClass="path" presetSubtype="0" accel="50000" decel="50000" fill="hold" grpId="0" nodeType="withEffect">
                                   <p:stCondLst>
                                     <p:cond delay="200"/>
                                   </p:stCondLst>
                                   <p:childTnLst>
                                     <p:animMotion origin="layout" path="M 2.29167E-6 7.40741E-7 L 0.29401 7.40741E-7 " pathEditMode="relative" rAng="0" ptsTypes="AA">
                                       <p:cBhvr>
-                                        <p:cTn id="146" dur="700" fill="hold"/>
+                                        <p:cTn id="151" dur="700" fill="hold"/>
                                         <p:tgtEl>
                                           <p:spTgt spid="19"/>
                                         </p:tgtEl>
@@ -16922,6 +17149,59 @@
                                       </p:cBhvr>
                                       <p:rCtr x="14701" y="0"/>
                                     </p:animMotion>
+                                  </p:childTnLst>
+                                </p:cTn>
+                              </p:par>
+                            </p:childTnLst>
+                          </p:cTn>
+                        </p:par>
+                      </p:childTnLst>
+                    </p:cTn>
+                  </p:par>
+                  <p:par>
+                    <p:cTn id="152" fill="hold">
+                      <p:stCondLst>
+                        <p:cond delay="indefinite"/>
+                      </p:stCondLst>
+                      <p:childTnLst>
+                        <p:par>
+                          <p:cTn id="153" fill="hold">
+                            <p:stCondLst>
+                              <p:cond delay="0"/>
+                            </p:stCondLst>
+                            <p:childTnLst>
+                              <p:par>
+                                <p:cTn id="154" presetID="10" presetClass="entr" presetSubtype="0" fill="hold" nodeType="clickEffect">
+                                  <p:stCondLst>
+                                    <p:cond delay="0"/>
+                                  </p:stCondLst>
+                                  <p:childTnLst>
+                                    <p:set>
+                                      <p:cBhvr>
+                                        <p:cTn id="155" dur="1" fill="hold">
+                                          <p:stCondLst>
+                                            <p:cond delay="0"/>
+                                          </p:stCondLst>
+                                        </p:cTn>
+                                        <p:tgtEl>
+                                          <p:spTgt spid="7"/>
+                                        </p:tgtEl>
+                                        <p:attrNameLst>
+                                          <p:attrName>style.visibility</p:attrName>
+                                        </p:attrNameLst>
+                                      </p:cBhvr>
+                                      <p:to>
+                                        <p:strVal val="visible"/>
+                                      </p:to>
+                                    </p:set>
+                                    <p:animEffect transition="in" filter="fade">
+                                      <p:cBhvr>
+                                        <p:cTn id="156" dur="500"/>
+                                        <p:tgtEl>
+                                          <p:spTgt spid="7"/>
+                                        </p:tgtEl>
+                                      </p:cBhvr>
+                                    </p:animEffect>
                                   </p:childTnLst>
                                 </p:cTn>
                               </p:par>
@@ -16985,6 +17265,7 @@
       <p:bldP spid="52" grpId="1" animBg="1"/>
       <p:bldP spid="6" grpId="0" animBg="1"/>
       <p:bldP spid="6" grpId="1" animBg="1"/>
+      <p:bldP spid="56" grpId="0" animBg="1"/>
     </p:bldLst>
   </p:timing>
 </p:sld>
@@ -18665,6 +18946,92 @@
           </a:p>
         </p:txBody>
       </p:sp>
+      <p:pic>
+        <p:nvPicPr>
+          <p:cNvPr id="5" name="그림 4">
+            <a:extLst>
+              <a:ext uri="{FF2B5EF4-FFF2-40B4-BE49-F238E27FC236}">
+                <a16:creationId xmlns:a16="http://schemas.microsoft.com/office/drawing/2014/main" id="{864DAC80-A729-40FF-8F4F-76C372404FD7}"/>
+              </a:ext>
+            </a:extLst>
+          </p:cNvPr>
+          <p:cNvPicPr>
+            <a:picLocks noChangeAspect="1"/>
+          </p:cNvPicPr>
+          <p:nvPr/>
+        </p:nvPicPr>
+        <p:blipFill>
+          <a:blip r:embed="rId6">
+            <a:extLst>
+              <a:ext uri="{28A0092B-C50C-407E-A947-70E740481C1C}">
+                <a14:useLocalDpi xmlns:a14="http://schemas.microsoft.com/office/drawing/2010/main" val="0"/>
+              </a:ext>
+            </a:extLst>
+          </a:blip>
+          <a:stretch>
+            <a:fillRect/>
+          </a:stretch>
+        </p:blipFill>
+        <p:spPr>
+          <a:xfrm>
+            <a:off x="609600" y="0"/>
+            <a:ext cx="10972800" cy="6858000"/>
+          </a:xfrm>
+          <a:prstGeom prst="rect">
+            <a:avLst/>
+          </a:prstGeom>
+        </p:spPr>
+      </p:pic>
+      <p:sp>
+        <p:nvSpPr>
+          <p:cNvPr id="30" name="직사각형 29">
+            <a:extLst>
+              <a:ext uri="{FF2B5EF4-FFF2-40B4-BE49-F238E27FC236}">
+                <a16:creationId xmlns:a16="http://schemas.microsoft.com/office/drawing/2014/main" id="{C094D38F-616A-4136-B3B3-2420E9C99CB4}"/>
+              </a:ext>
+            </a:extLst>
+          </p:cNvPr>
+          <p:cNvSpPr/>
+          <p:nvPr/>
+        </p:nvSpPr>
+        <p:spPr>
+          <a:xfrm>
+            <a:off x="11702234" y="830997"/>
+            <a:ext cx="268093" cy="149764"/>
+          </a:xfrm>
+          <a:prstGeom prst="rect">
+            <a:avLst/>
+          </a:prstGeom>
+          <a:noFill/>
+          <a:ln>
+            <a:noFill/>
+          </a:ln>
+        </p:spPr>
+        <p:style>
+          <a:lnRef idx="2">
+            <a:schemeClr val="accent1">
+              <a:shade val="50000"/>
+            </a:schemeClr>
+          </a:lnRef>
+          <a:fillRef idx="1">
+            <a:schemeClr val="accent1"/>
+          </a:fillRef>
+          <a:effectRef idx="0">
+            <a:schemeClr val="accent1"/>
+          </a:effectRef>
+          <a:fontRef idx="minor">
+            <a:schemeClr val="lt1"/>
+          </a:fontRef>
+        </p:style>
+        <p:txBody>
+          <a:bodyPr rtlCol="0" anchor="ctr"/>
+          <a:lstStyle/>
+          <a:p>
+            <a:pPr algn="ctr"/>
+            <a:endParaRPr lang="ko-KR" altLang="en-US"/>
+          </a:p>
+        </p:txBody>
+      </p:sp>
     </p:spTree>
     <p:extLst>
       <p:ext uri="{BB962C8B-B14F-4D97-AF65-F5344CB8AC3E}">
@@ -18687,6 +19054,145 @@
       </p:transition>
     </mc:Fallback>
   </mc:AlternateContent>
+  <p:timing>
+    <p:tnLst>
+      <p:par>
+        <p:cTn id="1" dur="indefinite" restart="never" nodeType="tmRoot">
+          <p:childTnLst>
+            <p:seq concurrent="1" nextAc="seek">
+              <p:cTn id="2" dur="indefinite" nodeType="mainSeq">
+                <p:childTnLst>
+                  <p:par>
+                    <p:cTn id="3" fill="hold">
+                      <p:stCondLst>
+                        <p:cond delay="indefinite"/>
+                      </p:stCondLst>
+                      <p:childTnLst>
+                        <p:par>
+                          <p:cTn id="4" fill="hold">
+                            <p:stCondLst>
+                              <p:cond delay="0"/>
+                            </p:stCondLst>
+                            <p:childTnLst>
+                              <p:par>
+                                <p:cTn id="5" presetID="10" presetClass="entr" presetSubtype="0" fill="hold" grpId="0" nodeType="clickEffect">
+                                  <p:stCondLst>
+                                    <p:cond delay="0"/>
+                                  </p:stCondLst>
+                                  <p:childTnLst>
+                                    <p:set>
+                                      <p:cBhvr>
+                                        <p:cTn id="6" dur="1" fill="hold">
+                                          <p:stCondLst>
+                                            <p:cond delay="0"/>
+                                          </p:stCondLst>
+                                        </p:cTn>
+                                        <p:tgtEl>
+                                          <p:spTgt spid="30"/>
+                                        </p:tgtEl>
+                                        <p:attrNameLst>
+                                          <p:attrName>style.visibility</p:attrName>
+                                        </p:attrNameLst>
+                                      </p:cBhvr>
+                                      <p:to>
+                                        <p:strVal val="visible"/>
+                                      </p:to>
+                                    </p:set>
+                                    <p:animEffect transition="in" filter="fade">
+                                      <p:cBhvr>
+                                        <p:cTn id="7" dur="1000"/>
+                                        <p:tgtEl>
+                                          <p:spTgt spid="30"/>
+                                        </p:tgtEl>
+                                      </p:cBhvr>
+                                    </p:animEffect>
+                                  </p:childTnLst>
+                                </p:cTn>
+                              </p:par>
+                            </p:childTnLst>
+                          </p:cTn>
+                        </p:par>
+                      </p:childTnLst>
+                    </p:cTn>
+                  </p:par>
+                  <p:par>
+                    <p:cTn id="8" fill="hold">
+                      <p:stCondLst>
+                        <p:cond delay="indefinite"/>
+                      </p:stCondLst>
+                      <p:childTnLst>
+                        <p:par>
+                          <p:cTn id="9" fill="hold">
+                            <p:stCondLst>
+                              <p:cond delay="0"/>
+                            </p:stCondLst>
+                            <p:childTnLst>
+                              <p:par>
+                                <p:cTn id="10" presetID="10" presetClass="entr" presetSubtype="0" fill="hold" nodeType="clickEffect">
+                                  <p:stCondLst>
+                                    <p:cond delay="0"/>
+                                  </p:stCondLst>
+                                  <p:childTnLst>
+                                    <p:set>
+                                      <p:cBhvr>
+                                        <p:cTn id="11" dur="1" fill="hold">
+                                          <p:stCondLst>
+                                            <p:cond delay="0"/>
+                                          </p:stCondLst>
+                                        </p:cTn>
+                                        <p:tgtEl>
+                                          <p:spTgt spid="5"/>
+                                        </p:tgtEl>
+                                        <p:attrNameLst>
+                                          <p:attrName>style.visibility</p:attrName>
+                                        </p:attrNameLst>
+                                      </p:cBhvr>
+                                      <p:to>
+                                        <p:strVal val="visible"/>
+                                      </p:to>
+                                    </p:set>
+                                    <p:animEffect transition="in" filter="fade">
+                                      <p:cBhvr>
+                                        <p:cTn id="12" dur="500"/>
+                                        <p:tgtEl>
+                                          <p:spTgt spid="5"/>
+                                        </p:tgtEl>
+                                      </p:cBhvr>
+                                    </p:animEffect>
+                                  </p:childTnLst>
+                                </p:cTn>
+                              </p:par>
+                            </p:childTnLst>
+                          </p:cTn>
+                        </p:par>
+                      </p:childTnLst>
+                    </p:cTn>
+                  </p:par>
+                </p:childTnLst>
+              </p:cTn>
+              <p:prevCondLst>
+                <p:cond evt="onPrev" delay="0">
+                  <p:tgtEl>
+                    <p:sldTgt/>
+                  </p:tgtEl>
+                </p:cond>
+              </p:prevCondLst>
+              <p:nextCondLst>
+                <p:cond evt="onNext" delay="0">
+                  <p:tgtEl>
+                    <p:sldTgt/>
+                  </p:tgtEl>
+                </p:cond>
+              </p:nextCondLst>
+            </p:seq>
+          </p:childTnLst>
+        </p:cTn>
+      </p:par>
+    </p:tnLst>
+    <p:bldLst>
+      <p:bldP spid="30" grpId="0" animBg="1"/>
+    </p:bldLst>
+  </p:timing>
 </p:sld>
 </file>
 
@@ -22631,6 +23137,92 @@
           </p:txBody>
         </p:sp>
       </p:grpSp>
+      <p:pic>
+        <p:nvPicPr>
+          <p:cNvPr id="6" name="그림 5" descr="텍스트이(가) 표시된 사진&#10;&#10;자동 생성된 설명">
+            <a:extLst>
+              <a:ext uri="{FF2B5EF4-FFF2-40B4-BE49-F238E27FC236}">
+                <a16:creationId xmlns:a16="http://schemas.microsoft.com/office/drawing/2014/main" id="{84591647-48C9-44DA-B53D-076CFF0CFAFC}"/>
+              </a:ext>
+            </a:extLst>
+          </p:cNvPr>
+          <p:cNvPicPr>
+            <a:picLocks noChangeAspect="1"/>
+          </p:cNvPicPr>
+          <p:nvPr/>
+        </p:nvPicPr>
+        <p:blipFill>
+          <a:blip r:embed="rId5">
+            <a:extLst>
+              <a:ext uri="{28A0092B-C50C-407E-A947-70E740481C1C}">
+                <a14:useLocalDpi xmlns:a14="http://schemas.microsoft.com/office/drawing/2010/main" val="0"/>
+              </a:ext>
+            </a:extLst>
+          </a:blip>
+          <a:stretch>
+            <a:fillRect/>
+          </a:stretch>
+        </p:blipFill>
+        <p:spPr>
+          <a:xfrm>
+            <a:off x="609600" y="0"/>
+            <a:ext cx="10972800" cy="6858000"/>
+          </a:xfrm>
+          <a:prstGeom prst="rect">
+            <a:avLst/>
+          </a:prstGeom>
+        </p:spPr>
+      </p:pic>
+      <p:sp>
+        <p:nvSpPr>
+          <p:cNvPr id="8" name="직사각형 7">
+            <a:extLst>
+              <a:ext uri="{FF2B5EF4-FFF2-40B4-BE49-F238E27FC236}">
+                <a16:creationId xmlns:a16="http://schemas.microsoft.com/office/drawing/2014/main" id="{AA83146F-79E2-40DA-8471-C1615A45B00A}"/>
+              </a:ext>
+            </a:extLst>
+          </p:cNvPr>
+          <p:cNvSpPr/>
+          <p:nvPr/>
+        </p:nvSpPr>
+        <p:spPr>
+          <a:xfrm>
+            <a:off x="11702234" y="830997"/>
+            <a:ext cx="268093" cy="149764"/>
+          </a:xfrm>
+          <a:prstGeom prst="rect">
+            <a:avLst/>
+          </a:prstGeom>
+          <a:noFill/>
+          <a:ln>
+            <a:noFill/>
+          </a:ln>
+        </p:spPr>
+        <p:style>
+          <a:lnRef idx="2">
+            <a:schemeClr val="accent1">
+              <a:shade val="50000"/>
+            </a:schemeClr>
+          </a:lnRef>
+          <a:fillRef idx="1">
+            <a:schemeClr val="accent1"/>
+          </a:fillRef>
+          <a:effectRef idx="0">
+            <a:schemeClr val="accent1"/>
+          </a:effectRef>
+          <a:fontRef idx="minor">
+            <a:schemeClr val="lt1"/>
+          </a:fontRef>
+        </p:style>
+        <p:txBody>
+          <a:bodyPr rtlCol="0" anchor="ctr"/>
+          <a:lstStyle/>
+          <a:p>
+            <a:pPr algn="ctr"/>
+            <a:endParaRPr lang="ko-KR" altLang="en-US"/>
+          </a:p>
+        </p:txBody>
+      </p:sp>
     </p:spTree>
     <p:extLst>
       <p:ext uri="{BB962C8B-B14F-4D97-AF65-F5344CB8AC3E}">
@@ -22662,14 +23254,67 @@
                             </p:stCondLst>
                             <p:childTnLst>
                               <p:par>
-                                <p:cTn id="5" presetID="10" presetClass="exit" presetSubtype="0" fill="hold" grpId="0" nodeType="clickEffect">
+                                <p:cTn id="5" presetID="10" presetClass="entr" presetSubtype="0" fill="hold" grpId="0" nodeType="clickEffect">
+                                  <p:stCondLst>
+                                    <p:cond delay="0"/>
+                                  </p:stCondLst>
+                                  <p:childTnLst>
+                                    <p:set>
+                                      <p:cBhvr>
+                                        <p:cTn id="6" dur="1" fill="hold">
+                                          <p:stCondLst>
+                                            <p:cond delay="0"/>
+                                          </p:stCondLst>
+                                        </p:cTn>
+                                        <p:tgtEl>
+                                          <p:spTgt spid="8"/>
+                                        </p:tgtEl>
+                                        <p:attrNameLst>
+                                          <p:attrName>style.visibility</p:attrName>
+                                        </p:attrNameLst>
+                                      </p:cBhvr>
+                                      <p:to>
+                                        <p:strVal val="visible"/>
+                                      </p:to>
+                                    </p:set>
+                                    <p:animEffect transition="in" filter="fade">
+                                      <p:cBhvr>
+                                        <p:cTn id="7" dur="1000"/>
+                                        <p:tgtEl>
+                                          <p:spTgt spid="8"/>
+                                        </p:tgtEl>
+                                      </p:cBhvr>
+                                    </p:animEffect>
+                                  </p:childTnLst>
+                                </p:cTn>
+                              </p:par>
+                            </p:childTnLst>
+                          </p:cTn>
+                        </p:par>
+                      </p:childTnLst>
+                    </p:cTn>
+                  </p:par>
+                  <p:par>
+                    <p:cTn id="8" fill="hold">
+                      <p:stCondLst>
+                        <p:cond delay="indefinite"/>
+                      </p:stCondLst>
+                      <p:childTnLst>
+                        <p:par>
+                          <p:cTn id="9" fill="hold">
+                            <p:stCondLst>
+                              <p:cond delay="0"/>
+                            </p:stCondLst>
+                            <p:childTnLst>
+                              <p:par>
+                                <p:cTn id="10" presetID="10" presetClass="exit" presetSubtype="0" fill="hold" grpId="0" nodeType="clickEffect">
                                   <p:stCondLst>
                                     <p:cond delay="0"/>
                                   </p:stCondLst>
                                   <p:childTnLst>
                                     <p:animEffect transition="out" filter="fade">
                                       <p:cBhvr>
-                                        <p:cTn id="6" dur="300"/>
+                                        <p:cTn id="11" dur="500"/>
                                         <p:tgtEl>
                                           <p:spTgt spid="73"/>
                                         </p:tgtEl>
@@ -22677,9 +23322,9 @@
                                     </p:animEffect>
                                     <p:set>
                                       <p:cBhvr>
-                                        <p:cTn id="7" dur="1" fill="hold">
+                                        <p:cTn id="12" dur="1" fill="hold">
                                           <p:stCondLst>
-                                            <p:cond delay="299"/>
+                                            <p:cond delay="499"/>
                                           </p:stCondLst>
                                         </p:cTn>
                                         <p:tgtEl>
@@ -22697,14 +23342,14 @@
                                 </p:cTn>
                               </p:par>
                               <p:par>
-                                <p:cTn id="8" presetID="10" presetClass="exit" presetSubtype="0" fill="hold" nodeType="withEffect">
+                                <p:cTn id="13" presetID="10" presetClass="exit" presetSubtype="0" fill="hold" nodeType="withEffect">
                                   <p:stCondLst>
                                     <p:cond delay="0"/>
                                   </p:stCondLst>
                                   <p:childTnLst>
                                     <p:animEffect transition="out" filter="fade">
                                       <p:cBhvr>
-                                        <p:cTn id="9" dur="100"/>
+                                        <p:cTn id="14" dur="100"/>
                                         <p:tgtEl>
                                           <p:spTgt spid="5"/>
                                         </p:tgtEl>
@@ -22712,7 +23357,7 @@
                                     </p:animEffect>
                                     <p:set>
                                       <p:cBhvr>
-                                        <p:cTn id="10" dur="1" fill="hold">
+                                        <p:cTn id="15" dur="1" fill="hold">
                                           <p:stCondLst>
                                             <p:cond delay="99"/>
                                           </p:stCondLst>
@@ -22732,14 +23377,14 @@
                                 </p:cTn>
                               </p:par>
                               <p:par>
-                                <p:cTn id="11" presetID="42" presetClass="path" presetSubtype="0" accel="50000" decel="50000" fill="hold" grpId="1" nodeType="withEffect">
+                                <p:cTn id="16" presetID="42" presetClass="path" presetSubtype="0" accel="50000" decel="50000" fill="hold" grpId="1" nodeType="withEffect">
                                   <p:stCondLst>
                                     <p:cond delay="0"/>
                                   </p:stCondLst>
                                   <p:childTnLst>
                                     <p:animMotion origin="layout" path="M -6.25E-7 2.59259E-6 L 0.32448 0.2919 " pathEditMode="relative" rAng="0" ptsTypes="AA">
                                       <p:cBhvr>
-                                        <p:cTn id="12" dur="300" fill="hold"/>
+                                        <p:cTn id="17" dur="500" fill="hold"/>
                                         <p:tgtEl>
                                           <p:spTgt spid="73"/>
                                         </p:tgtEl>
@@ -22754,14 +23399,14 @@
                                 </p:cTn>
                               </p:par>
                               <p:par>
-                                <p:cTn id="13" presetID="6" presetClass="emph" presetSubtype="0" fill="hold" grpId="2" nodeType="withEffect">
+                                <p:cTn id="18" presetID="6" presetClass="emph" presetSubtype="0" fill="hold" grpId="2" nodeType="withEffect">
                                   <p:stCondLst>
                                     <p:cond delay="0"/>
                                   </p:stCondLst>
                                   <p:childTnLst>
                                     <p:animScale>
                                       <p:cBhvr>
-                                        <p:cTn id="14" dur="300" fill="hold"/>
+                                        <p:cTn id="19" dur="500" fill="hold"/>
                                         <p:tgtEl>
                                           <p:spTgt spid="73"/>
                                         </p:tgtEl>
@@ -22772,14 +23417,14 @@
                                 </p:cTn>
                               </p:par>
                               <p:par>
-                                <p:cTn id="15" presetID="10" presetClass="entr" presetSubtype="0" fill="hold" grpId="0" nodeType="withEffect">
+                                <p:cTn id="20" presetID="10" presetClass="entr" presetSubtype="0" fill="hold" grpId="0" nodeType="withEffect">
                                   <p:stCondLst>
                                     <p:cond delay="250"/>
                                   </p:stCondLst>
                                   <p:childTnLst>
                                     <p:set>
                                       <p:cBhvr>
-                                        <p:cTn id="16" dur="1" fill="hold">
+                                        <p:cTn id="21" dur="1" fill="hold">
                                           <p:stCondLst>
                                             <p:cond delay="0"/>
                                           </p:stCondLst>
@@ -22797,62 +23442,9 @@
                                     </p:set>
                                     <p:animEffect transition="in" filter="fade">
                                       <p:cBhvr>
-                                        <p:cTn id="17" dur="200"/>
+                                        <p:cTn id="22" dur="200"/>
                                         <p:tgtEl>
                                           <p:spTgt spid="75"/>
-                                        </p:tgtEl>
-                                      </p:cBhvr>
-                                    </p:animEffect>
-                                  </p:childTnLst>
-                                </p:cTn>
-                              </p:par>
-                            </p:childTnLst>
-                          </p:cTn>
-                        </p:par>
-                      </p:childTnLst>
-                    </p:cTn>
-                  </p:par>
-                  <p:par>
-                    <p:cTn id="18" fill="hold">
-                      <p:stCondLst>
-                        <p:cond delay="indefinite"/>
-                      </p:stCondLst>
-                      <p:childTnLst>
-                        <p:par>
-                          <p:cTn id="19" fill="hold">
-                            <p:stCondLst>
-                              <p:cond delay="0"/>
-                            </p:stCondLst>
-                            <p:childTnLst>
-                              <p:par>
-                                <p:cTn id="20" presetID="10" presetClass="entr" presetSubtype="0" fill="hold" nodeType="clickEffect">
-                                  <p:stCondLst>
-                                    <p:cond delay="0"/>
-                                  </p:stCondLst>
-                                  <p:childTnLst>
-                                    <p:set>
-                                      <p:cBhvr>
-                                        <p:cTn id="21" dur="1" fill="hold">
-                                          <p:stCondLst>
-                                            <p:cond delay="0"/>
-                                          </p:stCondLst>
-                                        </p:cTn>
-                                        <p:tgtEl>
-                                          <p:spTgt spid="19"/>
-                                        </p:tgtEl>
-                                        <p:attrNameLst>
-                                          <p:attrName>style.visibility</p:attrName>
-                                        </p:attrNameLst>
-                                      </p:cBhvr>
-                                      <p:to>
-                                        <p:strVal val="visible"/>
-                                      </p:to>
-                                    </p:set>
-                                    <p:animEffect transition="in" filter="fade">
-                                      <p:cBhvr>
-                                        <p:cTn id="22" dur="500"/>
-                                        <p:tgtEl>
-                                          <p:spTgt spid="19"/>
                                         </p:tgtEl>
                                       </p:cBhvr>
                                     </p:animEffect>
@@ -22878,7 +23470,7 @@
                             </p:stCondLst>
                             <p:childTnLst>
                               <p:par>
-                                <p:cTn id="25" presetID="22" presetClass="entr" presetSubtype="8" fill="hold" grpId="0" nodeType="clickEffect">
+                                <p:cTn id="25" presetID="10" presetClass="entr" presetSubtype="0" fill="hold" nodeType="clickEffect">
                                   <p:stCondLst>
                                     <p:cond delay="0"/>
                                   </p:stCondLst>
@@ -22886,6 +23478,59 @@
                                     <p:set>
                                       <p:cBhvr>
                                         <p:cTn id="26" dur="1" fill="hold">
+                                          <p:stCondLst>
+                                            <p:cond delay="0"/>
+                                          </p:stCondLst>
+                                        </p:cTn>
+                                        <p:tgtEl>
+                                          <p:spTgt spid="19"/>
+                                        </p:tgtEl>
+                                        <p:attrNameLst>
+                                          <p:attrName>style.visibility</p:attrName>
+                                        </p:attrNameLst>
+                                      </p:cBhvr>
+                                      <p:to>
+                                        <p:strVal val="visible"/>
+                                      </p:to>
+                                    </p:set>
+                                    <p:animEffect transition="in" filter="fade">
+                                      <p:cBhvr>
+                                        <p:cTn id="27" dur="500"/>
+                                        <p:tgtEl>
+                                          <p:spTgt spid="19"/>
+                                        </p:tgtEl>
+                                      </p:cBhvr>
+                                    </p:animEffect>
+                                  </p:childTnLst>
+                                </p:cTn>
+                              </p:par>
+                            </p:childTnLst>
+                          </p:cTn>
+                        </p:par>
+                      </p:childTnLst>
+                    </p:cTn>
+                  </p:par>
+                  <p:par>
+                    <p:cTn id="28" fill="hold">
+                      <p:stCondLst>
+                        <p:cond delay="indefinite"/>
+                      </p:stCondLst>
+                      <p:childTnLst>
+                        <p:par>
+                          <p:cTn id="29" fill="hold">
+                            <p:stCondLst>
+                              <p:cond delay="0"/>
+                            </p:stCondLst>
+                            <p:childTnLst>
+                              <p:par>
+                                <p:cTn id="30" presetID="22" presetClass="entr" presetSubtype="8" fill="hold" grpId="0" nodeType="clickEffect">
+                                  <p:stCondLst>
+                                    <p:cond delay="0"/>
+                                  </p:stCondLst>
+                                  <p:childTnLst>
+                                    <p:set>
+                                      <p:cBhvr>
+                                        <p:cTn id="31" dur="1" fill="hold">
                                           <p:stCondLst>
                                             <p:cond delay="0"/>
                                           </p:stCondLst>
@@ -22903,7 +23548,7 @@
                                     </p:set>
                                     <p:animEffect transition="in" filter="wipe(left)">
                                       <p:cBhvr>
-                                        <p:cTn id="27" dur="300"/>
+                                        <p:cTn id="32" dur="300"/>
                                         <p:tgtEl>
                                           <p:spTgt spid="23"/>
                                         </p:tgtEl>
@@ -22913,14 +23558,14 @@
                                 </p:cTn>
                               </p:par>
                               <p:par>
-                                <p:cTn id="28" presetID="10" presetClass="entr" presetSubtype="0" fill="hold" grpId="0" nodeType="withEffect">
+                                <p:cTn id="33" presetID="10" presetClass="entr" presetSubtype="0" fill="hold" grpId="0" nodeType="withEffect">
                                   <p:stCondLst>
                                     <p:cond delay="250"/>
                                   </p:stCondLst>
                                   <p:childTnLst>
                                     <p:set>
                                       <p:cBhvr>
-                                        <p:cTn id="29" dur="1" fill="hold">
+                                        <p:cTn id="34" dur="1" fill="hold">
                                           <p:stCondLst>
                                             <p:cond delay="0"/>
                                           </p:stCondLst>
@@ -22938,7 +23583,7 @@
                                     </p:set>
                                     <p:animEffect transition="in" filter="fade">
                                       <p:cBhvr>
-                                        <p:cTn id="30" dur="300"/>
+                                        <p:cTn id="35" dur="300"/>
                                         <p:tgtEl>
                                           <p:spTgt spid="24"/>
                                         </p:tgtEl>
@@ -22948,14 +23593,14 @@
                                 </p:cTn>
                               </p:par>
                               <p:par>
-                                <p:cTn id="31" presetID="10" presetClass="entr" presetSubtype="0" fill="hold" grpId="0" nodeType="withEffect">
+                                <p:cTn id="36" presetID="10" presetClass="entr" presetSubtype="0" fill="hold" grpId="0" nodeType="withEffect">
                                   <p:stCondLst>
                                     <p:cond delay="250"/>
                                   </p:stCondLst>
                                   <p:childTnLst>
                                     <p:set>
                                       <p:cBhvr>
-                                        <p:cTn id="32" dur="1" fill="hold">
+                                        <p:cTn id="37" dur="1" fill="hold">
                                           <p:stCondLst>
                                             <p:cond delay="0"/>
                                           </p:stCondLst>
@@ -22973,7 +23618,7 @@
                                     </p:set>
                                     <p:animEffect transition="in" filter="fade">
                                       <p:cBhvr>
-                                        <p:cTn id="33" dur="300"/>
+                                        <p:cTn id="38" dur="300"/>
                                         <p:tgtEl>
                                           <p:spTgt spid="71"/>
                                         </p:tgtEl>
@@ -22983,14 +23628,14 @@
                                 </p:cTn>
                               </p:par>
                               <p:par>
-                                <p:cTn id="34" presetID="10" presetClass="entr" presetSubtype="0" fill="hold" grpId="0" nodeType="withEffect">
+                                <p:cTn id="39" presetID="10" presetClass="entr" presetSubtype="0" fill="hold" grpId="0" nodeType="withEffect">
                                   <p:stCondLst>
                                     <p:cond delay="250"/>
                                   </p:stCondLst>
                                   <p:childTnLst>
                                     <p:set>
                                       <p:cBhvr>
-                                        <p:cTn id="35" dur="1" fill="hold">
+                                        <p:cTn id="40" dur="1" fill="hold">
                                           <p:stCondLst>
                                             <p:cond delay="0"/>
                                           </p:stCondLst>
@@ -23008,7 +23653,7 @@
                                     </p:set>
                                     <p:animEffect transition="in" filter="fade">
                                       <p:cBhvr>
-                                        <p:cTn id="36" dur="300"/>
+                                        <p:cTn id="41" dur="300"/>
                                         <p:tgtEl>
                                           <p:spTgt spid="25"/>
                                         </p:tgtEl>
@@ -23018,14 +23663,14 @@
                                 </p:cTn>
                               </p:par>
                               <p:par>
-                                <p:cTn id="37" presetID="10" presetClass="entr" presetSubtype="0" fill="hold" grpId="0" nodeType="withEffect">
+                                <p:cTn id="42" presetID="10" presetClass="entr" presetSubtype="0" fill="hold" grpId="0" nodeType="withEffect">
                                   <p:stCondLst>
                                     <p:cond delay="250"/>
                                   </p:stCondLst>
                                   <p:childTnLst>
                                     <p:set>
                                       <p:cBhvr>
-                                        <p:cTn id="38" dur="1" fill="hold">
+                                        <p:cTn id="43" dur="1" fill="hold">
                                           <p:stCondLst>
                                             <p:cond delay="0"/>
                                           </p:stCondLst>
@@ -23043,7 +23688,7 @@
                                     </p:set>
                                     <p:animEffect transition="in" filter="fade">
                                       <p:cBhvr>
-                                        <p:cTn id="39" dur="300"/>
+                                        <p:cTn id="44" dur="300"/>
                                         <p:tgtEl>
                                           <p:spTgt spid="26"/>
                                         </p:tgtEl>
@@ -23053,14 +23698,14 @@
                                 </p:cTn>
                               </p:par>
                               <p:par>
-                                <p:cTn id="40" presetID="10" presetClass="entr" presetSubtype="0" fill="hold" nodeType="withEffect">
+                                <p:cTn id="45" presetID="10" presetClass="entr" presetSubtype="0" fill="hold" nodeType="withEffect">
                                   <p:stCondLst>
                                     <p:cond delay="250"/>
                                   </p:stCondLst>
                                   <p:childTnLst>
                                     <p:set>
                                       <p:cBhvr>
-                                        <p:cTn id="41" dur="1" fill="hold">
+                                        <p:cTn id="46" dur="1" fill="hold">
                                           <p:stCondLst>
                                             <p:cond delay="0"/>
                                           </p:stCondLst>
@@ -23078,7 +23723,7 @@
                                     </p:set>
                                     <p:animEffect transition="in" filter="fade">
                                       <p:cBhvr>
-                                        <p:cTn id="42" dur="300"/>
+                                        <p:cTn id="47" dur="300"/>
                                         <p:tgtEl>
                                           <p:spTgt spid="27"/>
                                         </p:tgtEl>
@@ -23088,14 +23733,14 @@
                                 </p:cTn>
                               </p:par>
                               <p:par>
-                                <p:cTn id="43" presetID="10" presetClass="entr" presetSubtype="0" fill="hold" grpId="0" nodeType="withEffect">
+                                <p:cTn id="48" presetID="10" presetClass="entr" presetSubtype="0" fill="hold" grpId="0" nodeType="withEffect">
                                   <p:stCondLst>
                                     <p:cond delay="250"/>
                                   </p:stCondLst>
                                   <p:childTnLst>
                                     <p:set>
                                       <p:cBhvr>
-                                        <p:cTn id="44" dur="1" fill="hold">
+                                        <p:cTn id="49" dur="1" fill="hold">
                                           <p:stCondLst>
                                             <p:cond delay="0"/>
                                           </p:stCondLst>
@@ -23113,7 +23758,7 @@
                                     </p:set>
                                     <p:animEffect transition="in" filter="fade">
                                       <p:cBhvr>
-                                        <p:cTn id="45" dur="300"/>
+                                        <p:cTn id="50" dur="300"/>
                                         <p:tgtEl>
                                           <p:spTgt spid="28"/>
                                         </p:tgtEl>
@@ -23123,14 +23768,14 @@
                                 </p:cTn>
                               </p:par>
                               <p:par>
-                                <p:cTn id="46" presetID="10" presetClass="entr" presetSubtype="0" fill="hold" grpId="0" nodeType="withEffect">
+                                <p:cTn id="51" presetID="10" presetClass="entr" presetSubtype="0" fill="hold" grpId="0" nodeType="withEffect">
                                   <p:stCondLst>
                                     <p:cond delay="250"/>
                                   </p:stCondLst>
                                   <p:childTnLst>
                                     <p:set>
                                       <p:cBhvr>
-                                        <p:cTn id="47" dur="1" fill="hold">
+                                        <p:cTn id="52" dur="1" fill="hold">
                                           <p:stCondLst>
                                             <p:cond delay="0"/>
                                           </p:stCondLst>
@@ -23148,7 +23793,7 @@
                                     </p:set>
                                     <p:animEffect transition="in" filter="fade">
                                       <p:cBhvr>
-                                        <p:cTn id="48" dur="300"/>
+                                        <p:cTn id="53" dur="300"/>
                                         <p:tgtEl>
                                           <p:spTgt spid="29"/>
                                         </p:tgtEl>
@@ -23158,14 +23803,14 @@
                                 </p:cTn>
                               </p:par>
                               <p:par>
-                                <p:cTn id="49" presetID="10" presetClass="entr" presetSubtype="0" fill="hold" nodeType="withEffect">
+                                <p:cTn id="54" presetID="10" presetClass="entr" presetSubtype="0" fill="hold" nodeType="withEffect">
                                   <p:stCondLst>
                                     <p:cond delay="250"/>
                                   </p:stCondLst>
                                   <p:childTnLst>
                                     <p:set>
                                       <p:cBhvr>
-                                        <p:cTn id="50" dur="1" fill="hold">
+                                        <p:cTn id="55" dur="1" fill="hold">
                                           <p:stCondLst>
                                             <p:cond delay="0"/>
                                           </p:stCondLst>
@@ -23183,7 +23828,7 @@
                                     </p:set>
                                     <p:animEffect transition="in" filter="fade">
                                       <p:cBhvr>
-                                        <p:cTn id="51" dur="300"/>
+                                        <p:cTn id="56" dur="300"/>
                                         <p:tgtEl>
                                           <p:spTgt spid="30"/>
                                         </p:tgtEl>
@@ -23193,14 +23838,14 @@
                                 </p:cTn>
                               </p:par>
                               <p:par>
-                                <p:cTn id="52" presetID="10" presetClass="entr" presetSubtype="0" fill="hold" grpId="0" nodeType="withEffect">
+                                <p:cTn id="57" presetID="10" presetClass="entr" presetSubtype="0" fill="hold" grpId="0" nodeType="withEffect">
                                   <p:stCondLst>
                                     <p:cond delay="250"/>
                                   </p:stCondLst>
                                   <p:childTnLst>
                                     <p:set>
                                       <p:cBhvr>
-                                        <p:cTn id="53" dur="1" fill="hold">
+                                        <p:cTn id="58" dur="1" fill="hold">
                                           <p:stCondLst>
                                             <p:cond delay="0"/>
                                           </p:stCondLst>
@@ -23218,7 +23863,7 @@
                                     </p:set>
                                     <p:animEffect transition="in" filter="fade">
                                       <p:cBhvr>
-                                        <p:cTn id="54" dur="300"/>
+                                        <p:cTn id="59" dur="300"/>
                                         <p:tgtEl>
                                           <p:spTgt spid="31"/>
                                         </p:tgtEl>
@@ -23228,14 +23873,14 @@
                                 </p:cTn>
                               </p:par>
                               <p:par>
-                                <p:cTn id="55" presetID="10" presetClass="entr" presetSubtype="0" fill="hold" grpId="0" nodeType="withEffect">
+                                <p:cTn id="60" presetID="10" presetClass="entr" presetSubtype="0" fill="hold" grpId="0" nodeType="withEffect">
                                   <p:stCondLst>
                                     <p:cond delay="250"/>
                                   </p:stCondLst>
                                   <p:childTnLst>
                                     <p:set>
                                       <p:cBhvr>
-                                        <p:cTn id="56" dur="1" fill="hold">
+                                        <p:cTn id="61" dur="1" fill="hold">
                                           <p:stCondLst>
                                             <p:cond delay="0"/>
                                           </p:stCondLst>
@@ -23253,7 +23898,7 @@
                                     </p:set>
                                     <p:animEffect transition="in" filter="fade">
                                       <p:cBhvr>
-                                        <p:cTn id="57" dur="300"/>
+                                        <p:cTn id="62" dur="300"/>
                                         <p:tgtEl>
                                           <p:spTgt spid="32"/>
                                         </p:tgtEl>
@@ -23263,14 +23908,14 @@
                                 </p:cTn>
                               </p:par>
                               <p:par>
-                                <p:cTn id="58" presetID="10" presetClass="entr" presetSubtype="0" fill="hold" nodeType="withEffect">
+                                <p:cTn id="63" presetID="10" presetClass="entr" presetSubtype="0" fill="hold" nodeType="withEffect">
                                   <p:stCondLst>
                                     <p:cond delay="250"/>
                                   </p:stCondLst>
                                   <p:childTnLst>
                                     <p:set>
                                       <p:cBhvr>
-                                        <p:cTn id="59" dur="1" fill="hold">
+                                        <p:cTn id="64" dur="1" fill="hold">
                                           <p:stCondLst>
                                             <p:cond delay="0"/>
                                           </p:stCondLst>
@@ -23288,7 +23933,7 @@
                                     </p:set>
                                     <p:animEffect transition="in" filter="fade">
                                       <p:cBhvr>
-                                        <p:cTn id="60" dur="300"/>
+                                        <p:cTn id="65" dur="300"/>
                                         <p:tgtEl>
                                           <p:spTgt spid="33"/>
                                         </p:tgtEl>
@@ -23298,14 +23943,14 @@
                                 </p:cTn>
                               </p:par>
                               <p:par>
-                                <p:cTn id="61" presetID="10" presetClass="entr" presetSubtype="0" fill="hold" grpId="0" nodeType="withEffect">
+                                <p:cTn id="66" presetID="10" presetClass="entr" presetSubtype="0" fill="hold" grpId="0" nodeType="withEffect">
                                   <p:stCondLst>
                                     <p:cond delay="250"/>
                                   </p:stCondLst>
                                   <p:childTnLst>
                                     <p:set>
                                       <p:cBhvr>
-                                        <p:cTn id="62" dur="1" fill="hold">
+                                        <p:cTn id="67" dur="1" fill="hold">
                                           <p:stCondLst>
                                             <p:cond delay="0"/>
                                           </p:stCondLst>
@@ -23323,7 +23968,7 @@
                                     </p:set>
                                     <p:animEffect transition="in" filter="fade">
                                       <p:cBhvr>
-                                        <p:cTn id="63" dur="300"/>
+                                        <p:cTn id="68" dur="300"/>
                                         <p:tgtEl>
                                           <p:spTgt spid="34"/>
                                         </p:tgtEl>
@@ -23333,14 +23978,14 @@
                                 </p:cTn>
                               </p:par>
                               <p:par>
-                                <p:cTn id="64" presetID="10" presetClass="entr" presetSubtype="0" fill="hold" grpId="0" nodeType="withEffect">
+                                <p:cTn id="69" presetID="10" presetClass="entr" presetSubtype="0" fill="hold" grpId="0" nodeType="withEffect">
                                   <p:stCondLst>
                                     <p:cond delay="250"/>
                                   </p:stCondLst>
                                   <p:childTnLst>
                                     <p:set>
                                       <p:cBhvr>
-                                        <p:cTn id="65" dur="1" fill="hold">
+                                        <p:cTn id="70" dur="1" fill="hold">
                                           <p:stCondLst>
                                             <p:cond delay="0"/>
                                           </p:stCondLst>
@@ -23358,7 +24003,7 @@
                                     </p:set>
                                     <p:animEffect transition="in" filter="fade">
                                       <p:cBhvr>
-                                        <p:cTn id="66" dur="300"/>
+                                        <p:cTn id="71" dur="300"/>
                                         <p:tgtEl>
                                           <p:spTgt spid="35"/>
                                         </p:tgtEl>
@@ -23368,14 +24013,14 @@
                                 </p:cTn>
                               </p:par>
                               <p:par>
-                                <p:cTn id="67" presetID="10" presetClass="entr" presetSubtype="0" fill="hold" nodeType="withEffect">
+                                <p:cTn id="72" presetID="10" presetClass="entr" presetSubtype="0" fill="hold" nodeType="withEffect">
                                   <p:stCondLst>
                                     <p:cond delay="250"/>
                                   </p:stCondLst>
                                   <p:childTnLst>
                                     <p:set>
                                       <p:cBhvr>
-                                        <p:cTn id="68" dur="1" fill="hold">
+                                        <p:cTn id="73" dur="1" fill="hold">
                                           <p:stCondLst>
                                             <p:cond delay="0"/>
                                           </p:stCondLst>
@@ -23393,7 +24038,7 @@
                                     </p:set>
                                     <p:animEffect transition="in" filter="fade">
                                       <p:cBhvr>
-                                        <p:cTn id="69" dur="300"/>
+                                        <p:cTn id="74" dur="300"/>
                                         <p:tgtEl>
                                           <p:spTgt spid="36"/>
                                         </p:tgtEl>
@@ -23403,14 +24048,14 @@
                                 </p:cTn>
                               </p:par>
                               <p:par>
-                                <p:cTn id="70" presetID="10" presetClass="entr" presetSubtype="0" fill="hold" grpId="0" nodeType="withEffect">
+                                <p:cTn id="75" presetID="10" presetClass="entr" presetSubtype="0" fill="hold" grpId="0" nodeType="withEffect">
                                   <p:stCondLst>
                                     <p:cond delay="250"/>
                                   </p:stCondLst>
                                   <p:childTnLst>
                                     <p:set>
                                       <p:cBhvr>
-                                        <p:cTn id="71" dur="1" fill="hold">
+                                        <p:cTn id="76" dur="1" fill="hold">
                                           <p:stCondLst>
                                             <p:cond delay="0"/>
                                           </p:stCondLst>
@@ -23428,7 +24073,7 @@
                                     </p:set>
                                     <p:animEffect transition="in" filter="fade">
                                       <p:cBhvr>
-                                        <p:cTn id="72" dur="300"/>
+                                        <p:cTn id="77" dur="300"/>
                                         <p:tgtEl>
                                           <p:spTgt spid="37"/>
                                         </p:tgtEl>
@@ -23438,14 +24083,14 @@
                                 </p:cTn>
                               </p:par>
                               <p:par>
-                                <p:cTn id="73" presetID="10" presetClass="entr" presetSubtype="0" fill="hold" nodeType="withEffect">
+                                <p:cTn id="78" presetID="10" presetClass="entr" presetSubtype="0" fill="hold" nodeType="withEffect">
                                   <p:stCondLst>
                                     <p:cond delay="250"/>
                                   </p:stCondLst>
                                   <p:childTnLst>
                                     <p:set>
                                       <p:cBhvr>
-                                        <p:cTn id="74" dur="1" fill="hold">
+                                        <p:cTn id="79" dur="1" fill="hold">
                                           <p:stCondLst>
                                             <p:cond delay="0"/>
                                           </p:stCondLst>
@@ -23463,7 +24108,7 @@
                                     </p:set>
                                     <p:animEffect transition="in" filter="fade">
                                       <p:cBhvr>
-                                        <p:cTn id="75" dur="300"/>
+                                        <p:cTn id="80" dur="300"/>
                                         <p:tgtEl>
                                           <p:spTgt spid="39"/>
                                         </p:tgtEl>
@@ -23473,14 +24118,14 @@
                                 </p:cTn>
                               </p:par>
                               <p:par>
-                                <p:cTn id="76" presetID="10" presetClass="entr" presetSubtype="0" fill="hold" grpId="0" nodeType="withEffect">
+                                <p:cTn id="81" presetID="10" presetClass="entr" presetSubtype="0" fill="hold" grpId="0" nodeType="withEffect">
                                   <p:stCondLst>
                                     <p:cond delay="250"/>
                                   </p:stCondLst>
                                   <p:childTnLst>
                                     <p:set>
                                       <p:cBhvr>
-                                        <p:cTn id="77" dur="1" fill="hold">
+                                        <p:cTn id="82" dur="1" fill="hold">
                                           <p:stCondLst>
                                             <p:cond delay="0"/>
                                           </p:stCondLst>
@@ -23498,7 +24143,7 @@
                                     </p:set>
                                     <p:animEffect transition="in" filter="fade">
                                       <p:cBhvr>
-                                        <p:cTn id="78" dur="300"/>
+                                        <p:cTn id="83" dur="300"/>
                                         <p:tgtEl>
                                           <p:spTgt spid="38"/>
                                         </p:tgtEl>
@@ -23514,26 +24159,26 @@
                     </p:cTn>
                   </p:par>
                   <p:par>
-                    <p:cTn id="79" fill="hold">
+                    <p:cTn id="84" fill="hold">
                       <p:stCondLst>
                         <p:cond delay="indefinite"/>
                       </p:stCondLst>
                       <p:childTnLst>
                         <p:par>
-                          <p:cTn id="80" fill="hold">
+                          <p:cTn id="85" fill="hold">
                             <p:stCondLst>
                               <p:cond delay="0"/>
                             </p:stCondLst>
                             <p:childTnLst>
                               <p:par>
-                                <p:cTn id="81" presetID="1" presetClass="entr" presetSubtype="0" fill="hold" nodeType="clickEffect">
+                                <p:cTn id="86" presetID="1" presetClass="entr" presetSubtype="0" fill="hold" nodeType="clickEffect">
                                   <p:stCondLst>
                                     <p:cond delay="0"/>
                                   </p:stCondLst>
                                   <p:childTnLst>
                                     <p:set>
                                       <p:cBhvr>
-                                        <p:cTn id="82" dur="1" fill="hold">
+                                        <p:cTn id="87" dur="1" fill="hold">
                                           <p:stCondLst>
                                             <p:cond delay="0"/>
                                           </p:stCondLst>
@@ -23559,26 +24204,26 @@
                     </p:cTn>
                   </p:par>
                   <p:par>
-                    <p:cTn id="83" fill="hold">
+                    <p:cTn id="88" fill="hold">
                       <p:stCondLst>
                         <p:cond delay="indefinite"/>
                       </p:stCondLst>
                       <p:childTnLst>
                         <p:par>
-                          <p:cTn id="84" fill="hold">
+                          <p:cTn id="89" fill="hold">
                             <p:stCondLst>
                               <p:cond delay="0"/>
                             </p:stCondLst>
                             <p:childTnLst>
                               <p:par>
-                                <p:cTn id="85" presetID="22" presetClass="entr" presetSubtype="8" fill="hold" grpId="0" nodeType="clickEffect">
+                                <p:cTn id="90" presetID="22" presetClass="entr" presetSubtype="8" fill="hold" grpId="0" nodeType="clickEffect">
                                   <p:stCondLst>
                                     <p:cond delay="0"/>
                                   </p:stCondLst>
                                   <p:childTnLst>
                                     <p:set>
                                       <p:cBhvr>
-                                        <p:cTn id="86" dur="1" fill="hold">
+                                        <p:cTn id="91" dur="1" fill="hold">
                                           <p:stCondLst>
                                             <p:cond delay="0"/>
                                           </p:stCondLst>
@@ -23596,7 +24241,7 @@
                                     </p:set>
                                     <p:animEffect transition="in" filter="wipe(left)">
                                       <p:cBhvr>
-                                        <p:cTn id="87" dur="300"/>
+                                        <p:cTn id="92" dur="300"/>
                                         <p:tgtEl>
                                           <p:spTgt spid="49"/>
                                         </p:tgtEl>
@@ -23609,20 +24254,20 @@
                           </p:cTn>
                         </p:par>
                         <p:par>
-                          <p:cTn id="88" fill="hold">
+                          <p:cTn id="93" fill="hold">
                             <p:stCondLst>
                               <p:cond delay="300"/>
                             </p:stCondLst>
                             <p:childTnLst>
                               <p:par>
-                                <p:cTn id="89" presetID="10" presetClass="entr" presetSubtype="0" fill="hold" nodeType="afterEffect">
+                                <p:cTn id="94" presetID="10" presetClass="entr" presetSubtype="0" fill="hold" nodeType="afterEffect">
                                   <p:stCondLst>
                                     <p:cond delay="0"/>
                                   </p:stCondLst>
                                   <p:childTnLst>
                                     <p:set>
                                       <p:cBhvr>
-                                        <p:cTn id="90" dur="1" fill="hold">
+                                        <p:cTn id="95" dur="1" fill="hold">
                                           <p:stCondLst>
                                             <p:cond delay="0"/>
                                           </p:stCondLst>
@@ -23640,9 +24285,62 @@
                                     </p:set>
                                     <p:animEffect transition="in" filter="fade">
                                       <p:cBhvr>
-                                        <p:cTn id="91" dur="300"/>
+                                        <p:cTn id="96" dur="300"/>
                                         <p:tgtEl>
                                           <p:spTgt spid="47"/>
+                                        </p:tgtEl>
+                                      </p:cBhvr>
+                                    </p:animEffect>
+                                  </p:childTnLst>
+                                </p:cTn>
+                              </p:par>
+                            </p:childTnLst>
+                          </p:cTn>
+                        </p:par>
+                      </p:childTnLst>
+                    </p:cTn>
+                  </p:par>
+                  <p:par>
+                    <p:cTn id="97" fill="hold">
+                      <p:stCondLst>
+                        <p:cond delay="indefinite"/>
+                      </p:stCondLst>
+                      <p:childTnLst>
+                        <p:par>
+                          <p:cTn id="98" fill="hold">
+                            <p:stCondLst>
+                              <p:cond delay="0"/>
+                            </p:stCondLst>
+                            <p:childTnLst>
+                              <p:par>
+                                <p:cTn id="99" presetID="10" presetClass="entr" presetSubtype="0" fill="hold" nodeType="clickEffect">
+                                  <p:stCondLst>
+                                    <p:cond delay="0"/>
+                                  </p:stCondLst>
+                                  <p:childTnLst>
+                                    <p:set>
+                                      <p:cBhvr>
+                                        <p:cTn id="100" dur="1" fill="hold">
+                                          <p:stCondLst>
+                                            <p:cond delay="0"/>
+                                          </p:stCondLst>
+                                        </p:cTn>
+                                        <p:tgtEl>
+                                          <p:spTgt spid="6"/>
+                                        </p:tgtEl>
+                                        <p:attrNameLst>
+                                          <p:attrName>style.visibility</p:attrName>
+                                        </p:attrNameLst>
+                                      </p:cBhvr>
+                                      <p:to>
+                                        <p:strVal val="visible"/>
+                                      </p:to>
+                                    </p:set>
+                                    <p:animEffect transition="in" filter="fade">
+                                      <p:cBhvr>
+                                        <p:cTn id="101" dur="500"/>
+                                        <p:tgtEl>
+                                          <p:spTgt spid="6"/>
                                         </p:tgtEl>
                                       </p:cBhvr>
                                     </p:animEffect>
@@ -23695,6 +24393,7 @@
       <p:bldP spid="73" grpId="0" animBg="1"/>
       <p:bldP spid="73" grpId="1" animBg="1"/>
       <p:bldP spid="73" grpId="2" animBg="1"/>
+      <p:bldP spid="8" grpId="0" animBg="1"/>
     </p:bldLst>
   </p:timing>
 </p:sld>
@@ -29392,6 +30091,56 @@
           </a:ln>
         </p:spPr>
       </p:pic>
+      <p:sp>
+        <p:nvSpPr>
+          <p:cNvPr id="75" name="직사각형 74">
+            <a:extLst>
+              <a:ext uri="{FF2B5EF4-FFF2-40B4-BE49-F238E27FC236}">
+                <a16:creationId xmlns:a16="http://schemas.microsoft.com/office/drawing/2014/main" id="{9DD29459-F214-4FB2-B5D4-C9F9C9FAB270}"/>
+              </a:ext>
+            </a:extLst>
+          </p:cNvPr>
+          <p:cNvSpPr/>
+          <p:nvPr/>
+        </p:nvSpPr>
+        <p:spPr>
+          <a:xfrm>
+            <a:off x="11702234" y="830997"/>
+            <a:ext cx="268093" cy="149764"/>
+          </a:xfrm>
+          <a:prstGeom prst="rect">
+            <a:avLst/>
+          </a:prstGeom>
+          <a:noFill/>
+          <a:ln>
+            <a:noFill/>
+          </a:ln>
+        </p:spPr>
+        <p:style>
+          <a:lnRef idx="2">
+            <a:schemeClr val="accent1">
+              <a:shade val="50000"/>
+            </a:schemeClr>
+          </a:lnRef>
+          <a:fillRef idx="1">
+            <a:schemeClr val="accent1"/>
+          </a:fillRef>
+          <a:effectRef idx="0">
+            <a:schemeClr val="accent1"/>
+          </a:effectRef>
+          <a:fontRef idx="minor">
+            <a:schemeClr val="lt1"/>
+          </a:fontRef>
+        </p:style>
+        <p:txBody>
+          <a:bodyPr rtlCol="0" anchor="ctr"/>
+          <a:lstStyle/>
+          <a:p>
+            <a:pPr algn="ctr"/>
+            <a:endParaRPr lang="ko-KR" altLang="en-US"/>
+          </a:p>
+        </p:txBody>
+      </p:sp>
     </p:spTree>
     <p:extLst>
       <p:ext uri="{BB962C8B-B14F-4D97-AF65-F5344CB8AC3E}">
@@ -29423,14 +30172,67 @@
                             </p:stCondLst>
                             <p:childTnLst>
                               <p:par>
-                                <p:cTn id="5" presetID="10" presetClass="exit" presetSubtype="0" fill="hold" grpId="0" nodeType="clickEffect">
+                                <p:cTn id="5" presetID="10" presetClass="entr" presetSubtype="0" fill="hold" grpId="0" nodeType="clickEffect">
+                                  <p:stCondLst>
+                                    <p:cond delay="0"/>
+                                  </p:stCondLst>
+                                  <p:childTnLst>
+                                    <p:set>
+                                      <p:cBhvr>
+                                        <p:cTn id="6" dur="1" fill="hold">
+                                          <p:stCondLst>
+                                            <p:cond delay="0"/>
+                                          </p:stCondLst>
+                                        </p:cTn>
+                                        <p:tgtEl>
+                                          <p:spTgt spid="75"/>
+                                        </p:tgtEl>
+                                        <p:attrNameLst>
+                                          <p:attrName>style.visibility</p:attrName>
+                                        </p:attrNameLst>
+                                      </p:cBhvr>
+                                      <p:to>
+                                        <p:strVal val="visible"/>
+                                      </p:to>
+                                    </p:set>
+                                    <p:animEffect transition="in" filter="fade">
+                                      <p:cBhvr>
+                                        <p:cTn id="7" dur="1000"/>
+                                        <p:tgtEl>
+                                          <p:spTgt spid="75"/>
+                                        </p:tgtEl>
+                                      </p:cBhvr>
+                                    </p:animEffect>
+                                  </p:childTnLst>
+                                </p:cTn>
+                              </p:par>
+                            </p:childTnLst>
+                          </p:cTn>
+                        </p:par>
+                      </p:childTnLst>
+                    </p:cTn>
+                  </p:par>
+                  <p:par>
+                    <p:cTn id="8" fill="hold">
+                      <p:stCondLst>
+                        <p:cond delay="indefinite"/>
+                      </p:stCondLst>
+                      <p:childTnLst>
+                        <p:par>
+                          <p:cTn id="9" fill="hold">
+                            <p:stCondLst>
+                              <p:cond delay="0"/>
+                            </p:stCondLst>
+                            <p:childTnLst>
+                              <p:par>
+                                <p:cTn id="10" presetID="10" presetClass="exit" presetSubtype="0" fill="hold" grpId="0" nodeType="clickEffect">
                                   <p:stCondLst>
                                     <p:cond delay="0"/>
                                   </p:stCondLst>
                                   <p:childTnLst>
                                     <p:animEffect transition="out" filter="fade">
                                       <p:cBhvr>
-                                        <p:cTn id="6" dur="300"/>
+                                        <p:cTn id="11" dur="300"/>
                                         <p:tgtEl>
                                           <p:spTgt spid="60"/>
                                         </p:tgtEl>
@@ -29438,7 +30240,7 @@
                                     </p:animEffect>
                                     <p:set>
                                       <p:cBhvr>
-                                        <p:cTn id="7" dur="1" fill="hold">
+                                        <p:cTn id="12" dur="1" fill="hold">
                                           <p:stCondLst>
                                             <p:cond delay="299"/>
                                           </p:stCondLst>
@@ -29458,14 +30260,14 @@
                                 </p:cTn>
                               </p:par>
                               <p:par>
-                                <p:cTn id="8" presetID="10" presetClass="entr" presetSubtype="0" fill="hold" grpId="3" nodeType="withEffect">
+                                <p:cTn id="13" presetID="10" presetClass="entr" presetSubtype="0" fill="hold" grpId="3" nodeType="withEffect">
                                   <p:stCondLst>
                                     <p:cond delay="0"/>
                                   </p:stCondLst>
                                   <p:childTnLst>
                                     <p:set>
                                       <p:cBhvr>
-                                        <p:cTn id="9" dur="1" fill="hold">
+                                        <p:cTn id="14" dur="1" fill="hold">
                                           <p:stCondLst>
                                             <p:cond delay="0"/>
                                           </p:stCondLst>
@@ -29483,7 +30285,7 @@
                                     </p:set>
                                     <p:animEffect transition="in" filter="fade">
                                       <p:cBhvr>
-                                        <p:cTn id="10" dur="300"/>
+                                        <p:cTn id="15" dur="300"/>
                                         <p:tgtEl>
                                           <p:spTgt spid="99"/>
                                         </p:tgtEl>
@@ -29493,14 +30295,14 @@
                                 </p:cTn>
                               </p:par>
                               <p:par>
-                                <p:cTn id="11" presetID="10" presetClass="entr" presetSubtype="0" fill="hold" grpId="0" nodeType="withEffect">
+                                <p:cTn id="16" presetID="10" presetClass="entr" presetSubtype="0" fill="hold" grpId="0" nodeType="withEffect">
                                   <p:stCondLst>
                                     <p:cond delay="0"/>
                                   </p:stCondLst>
                                   <p:childTnLst>
                                     <p:set>
                                       <p:cBhvr>
-                                        <p:cTn id="12" dur="1" fill="hold">
+                                        <p:cTn id="17" dur="1" fill="hold">
                                           <p:stCondLst>
                                             <p:cond delay="0"/>
                                           </p:stCondLst>
@@ -29518,7 +30320,7 @@
                                     </p:set>
                                     <p:animEffect transition="in" filter="fade">
                                       <p:cBhvr>
-                                        <p:cTn id="13" dur="300"/>
+                                        <p:cTn id="18" dur="300"/>
                                         <p:tgtEl>
                                           <p:spTgt spid="73"/>
                                         </p:tgtEl>
@@ -29528,14 +30330,14 @@
                                 </p:cTn>
                               </p:par>
                               <p:par>
-                                <p:cTn id="14" presetID="10" presetClass="entr" presetSubtype="0" fill="hold" grpId="0" nodeType="withEffect">
+                                <p:cTn id="19" presetID="10" presetClass="entr" presetSubtype="0" fill="hold" grpId="0" nodeType="withEffect">
                                   <p:stCondLst>
                                     <p:cond delay="0"/>
                                   </p:stCondLst>
                                   <p:childTnLst>
                                     <p:set>
                                       <p:cBhvr>
-                                        <p:cTn id="15" dur="1" fill="hold">
+                                        <p:cTn id="20" dur="1" fill="hold">
                                           <p:stCondLst>
                                             <p:cond delay="0"/>
                                           </p:stCondLst>
@@ -29553,7 +30355,7 @@
                                     </p:set>
                                     <p:animEffect transition="in" filter="fade">
                                       <p:cBhvr>
-                                        <p:cTn id="16" dur="300"/>
+                                        <p:cTn id="21" dur="300"/>
                                         <p:tgtEl>
                                           <p:spTgt spid="70"/>
                                         </p:tgtEl>
@@ -29569,26 +30371,26 @@
                     </p:cTn>
                   </p:par>
                   <p:par>
-                    <p:cTn id="17" fill="hold">
+                    <p:cTn id="22" fill="hold">
                       <p:stCondLst>
                         <p:cond delay="indefinite"/>
                       </p:stCondLst>
                       <p:childTnLst>
                         <p:par>
-                          <p:cTn id="18" fill="hold">
+                          <p:cTn id="23" fill="hold">
                             <p:stCondLst>
                               <p:cond delay="0"/>
                             </p:stCondLst>
                             <p:childTnLst>
                               <p:par>
-                                <p:cTn id="19" presetID="10" presetClass="exit" presetSubtype="0" fill="hold" grpId="0" nodeType="clickEffect">
+                                <p:cTn id="24" presetID="10" presetClass="exit" presetSubtype="0" fill="hold" grpId="0" nodeType="clickEffect">
                                   <p:stCondLst>
                                     <p:cond delay="0"/>
                                   </p:stCondLst>
                                   <p:childTnLst>
                                     <p:animEffect transition="out" filter="fade">
                                       <p:cBhvr>
-                                        <p:cTn id="20" dur="300"/>
+                                        <p:cTn id="25" dur="300"/>
                                         <p:tgtEl>
                                           <p:spTgt spid="99"/>
                                         </p:tgtEl>
@@ -29596,7 +30398,7 @@
                                     </p:animEffect>
                                     <p:set>
                                       <p:cBhvr>
-                                        <p:cTn id="21" dur="1" fill="hold">
+                                        <p:cTn id="26" dur="1" fill="hold">
                                           <p:stCondLst>
                                             <p:cond delay="299"/>
                                           </p:stCondLst>
@@ -29616,14 +30418,14 @@
                                 </p:cTn>
                               </p:par>
                               <p:par>
-                                <p:cTn id="22" presetID="42" presetClass="path" presetSubtype="0" accel="50000" decel="50000" fill="hold" grpId="1" nodeType="withEffect">
+                                <p:cTn id="27" presetID="42" presetClass="path" presetSubtype="0" accel="50000" decel="50000" fill="hold" grpId="1" nodeType="withEffect">
                                   <p:stCondLst>
                                     <p:cond delay="0"/>
                                   </p:stCondLst>
                                   <p:childTnLst>
                                     <p:animMotion origin="layout" path="M 2.29167E-6 4.07407E-6 L 0.51549 4.07407E-6 " pathEditMode="relative" rAng="0" ptsTypes="AA">
                                       <p:cBhvr>
-                                        <p:cTn id="23" dur="300" fill="hold"/>
+                                        <p:cTn id="28" dur="300" fill="hold"/>
                                         <p:tgtEl>
                                           <p:spTgt spid="99"/>
                                         </p:tgtEl>
@@ -29638,14 +30440,14 @@
                                 </p:cTn>
                               </p:par>
                               <p:par>
-                                <p:cTn id="24" presetID="6" presetClass="emph" presetSubtype="0" fill="hold" grpId="2" nodeType="withEffect">
+                                <p:cTn id="29" presetID="6" presetClass="emph" presetSubtype="0" fill="hold" grpId="2" nodeType="withEffect">
                                   <p:stCondLst>
                                     <p:cond delay="0"/>
                                   </p:stCondLst>
                                   <p:childTnLst>
                                     <p:animScale>
                                       <p:cBhvr>
-                                        <p:cTn id="25" dur="300" fill="hold"/>
+                                        <p:cTn id="30" dur="300" fill="hold"/>
                                         <p:tgtEl>
                                           <p:spTgt spid="99"/>
                                         </p:tgtEl>
@@ -29656,14 +30458,14 @@
                                 </p:cTn>
                               </p:par>
                               <p:par>
-                                <p:cTn id="26" presetID="22" presetClass="entr" presetSubtype="2" fill="hold" grpId="0" nodeType="withEffect">
+                                <p:cTn id="31" presetID="22" presetClass="entr" presetSubtype="2" fill="hold" grpId="0" nodeType="withEffect">
                                   <p:stCondLst>
                                     <p:cond delay="200"/>
                                   </p:stCondLst>
                                   <p:childTnLst>
                                     <p:set>
                                       <p:cBhvr>
-                                        <p:cTn id="27" dur="1" fill="hold">
+                                        <p:cTn id="32" dur="1" fill="hold">
                                           <p:stCondLst>
                                             <p:cond delay="0"/>
                                           </p:stCondLst>
@@ -29681,62 +30483,9 @@
                                     </p:set>
                                     <p:animEffect transition="in" filter="wipe(right)">
                                       <p:cBhvr>
-                                        <p:cTn id="28" dur="300"/>
+                                        <p:cTn id="33" dur="300"/>
                                         <p:tgtEl>
                                           <p:spTgt spid="100"/>
-                                        </p:tgtEl>
-                                      </p:cBhvr>
-                                    </p:animEffect>
-                                  </p:childTnLst>
-                                </p:cTn>
-                              </p:par>
-                            </p:childTnLst>
-                          </p:cTn>
-                        </p:par>
-                      </p:childTnLst>
-                    </p:cTn>
-                  </p:par>
-                  <p:par>
-                    <p:cTn id="29" fill="hold">
-                      <p:stCondLst>
-                        <p:cond delay="indefinite"/>
-                      </p:stCondLst>
-                      <p:childTnLst>
-                        <p:par>
-                          <p:cTn id="30" fill="hold">
-                            <p:stCondLst>
-                              <p:cond delay="0"/>
-                            </p:stCondLst>
-                            <p:childTnLst>
-                              <p:par>
-                                <p:cTn id="31" presetID="22" presetClass="entr" presetSubtype="8" fill="hold" grpId="0" nodeType="clickEffect">
-                                  <p:stCondLst>
-                                    <p:cond delay="0"/>
-                                  </p:stCondLst>
-                                  <p:childTnLst>
-                                    <p:set>
-                                      <p:cBhvr>
-                                        <p:cTn id="32" dur="1" fill="hold">
-                                          <p:stCondLst>
-                                            <p:cond delay="0"/>
-                                          </p:stCondLst>
-                                        </p:cTn>
-                                        <p:tgtEl>
-                                          <p:spTgt spid="25"/>
-                                        </p:tgtEl>
-                                        <p:attrNameLst>
-                                          <p:attrName>style.visibility</p:attrName>
-                                        </p:attrNameLst>
-                                      </p:cBhvr>
-                                      <p:to>
-                                        <p:strVal val="visible"/>
-                                      </p:to>
-                                    </p:set>
-                                    <p:animEffect transition="in" filter="wipe(left)">
-                                      <p:cBhvr>
-                                        <p:cTn id="33" dur="300"/>
-                                        <p:tgtEl>
-                                          <p:spTgt spid="25"/>
                                         </p:tgtEl>
                                       </p:cBhvr>
                                     </p:animEffect>
@@ -29762,7 +30511,7 @@
                             </p:stCondLst>
                             <p:childTnLst>
                               <p:par>
-                                <p:cTn id="36" presetID="10" presetClass="entr" presetSubtype="0" fill="hold" nodeType="clickEffect">
+                                <p:cTn id="36" presetID="22" presetClass="entr" presetSubtype="8" fill="hold" grpId="0" nodeType="clickEffect">
                                   <p:stCondLst>
                                     <p:cond delay="0"/>
                                   </p:stCondLst>
@@ -29770,6 +30519,59 @@
                                     <p:set>
                                       <p:cBhvr>
                                         <p:cTn id="37" dur="1" fill="hold">
+                                          <p:stCondLst>
+                                            <p:cond delay="0"/>
+                                          </p:stCondLst>
+                                        </p:cTn>
+                                        <p:tgtEl>
+                                          <p:spTgt spid="25"/>
+                                        </p:tgtEl>
+                                        <p:attrNameLst>
+                                          <p:attrName>style.visibility</p:attrName>
+                                        </p:attrNameLst>
+                                      </p:cBhvr>
+                                      <p:to>
+                                        <p:strVal val="visible"/>
+                                      </p:to>
+                                    </p:set>
+                                    <p:animEffect transition="in" filter="wipe(left)">
+                                      <p:cBhvr>
+                                        <p:cTn id="38" dur="300"/>
+                                        <p:tgtEl>
+                                          <p:spTgt spid="25"/>
+                                        </p:tgtEl>
+                                      </p:cBhvr>
+                                    </p:animEffect>
+                                  </p:childTnLst>
+                                </p:cTn>
+                              </p:par>
+                            </p:childTnLst>
+                          </p:cTn>
+                        </p:par>
+                      </p:childTnLst>
+                    </p:cTn>
+                  </p:par>
+                  <p:par>
+                    <p:cTn id="39" fill="hold">
+                      <p:stCondLst>
+                        <p:cond delay="indefinite"/>
+                      </p:stCondLst>
+                      <p:childTnLst>
+                        <p:par>
+                          <p:cTn id="40" fill="hold">
+                            <p:stCondLst>
+                              <p:cond delay="0"/>
+                            </p:stCondLst>
+                            <p:childTnLst>
+                              <p:par>
+                                <p:cTn id="41" presetID="10" presetClass="entr" presetSubtype="0" fill="hold" nodeType="clickEffect">
+                                  <p:stCondLst>
+                                    <p:cond delay="0"/>
+                                  </p:stCondLst>
+                                  <p:childTnLst>
+                                    <p:set>
+                                      <p:cBhvr>
+                                        <p:cTn id="42" dur="1" fill="hold">
                                           <p:stCondLst>
                                             <p:cond delay="0"/>
                                           </p:stCondLst>
@@ -29787,7 +30589,7 @@
                                     </p:set>
                                     <p:animEffect transition="in" filter="fade">
                                       <p:cBhvr>
-                                        <p:cTn id="38" dur="300"/>
+                                        <p:cTn id="43" dur="300"/>
                                         <p:tgtEl>
                                           <p:spTgt spid="26"/>
                                         </p:tgtEl>
@@ -29797,14 +30599,14 @@
                                 </p:cTn>
                               </p:par>
                               <p:par>
-                                <p:cTn id="39" presetID="10" presetClass="entr" presetSubtype="0" fill="hold" grpId="0" nodeType="withEffect">
+                                <p:cTn id="44" presetID="10" presetClass="entr" presetSubtype="0" fill="hold" grpId="0" nodeType="withEffect">
                                   <p:stCondLst>
                                     <p:cond delay="0"/>
                                   </p:stCondLst>
                                   <p:childTnLst>
                                     <p:set>
                                       <p:cBhvr>
-                                        <p:cTn id="40" dur="1" fill="hold">
+                                        <p:cTn id="45" dur="1" fill="hold">
                                           <p:stCondLst>
                                             <p:cond delay="0"/>
                                           </p:stCondLst>
@@ -29822,7 +30624,7 @@
                                     </p:set>
                                     <p:animEffect transition="in" filter="fade">
                                       <p:cBhvr>
-                                        <p:cTn id="41" dur="300"/>
+                                        <p:cTn id="46" dur="300"/>
                                         <p:tgtEl>
                                           <p:spTgt spid="27"/>
                                         </p:tgtEl>
@@ -29832,14 +30634,14 @@
                                 </p:cTn>
                               </p:par>
                               <p:par>
-                                <p:cTn id="42" presetID="10" presetClass="entr" presetSubtype="0" fill="hold" nodeType="withEffect">
+                                <p:cTn id="47" presetID="10" presetClass="entr" presetSubtype="0" fill="hold" nodeType="withEffect">
                                   <p:stCondLst>
                                     <p:cond delay="0"/>
                                   </p:stCondLst>
                                   <p:childTnLst>
                                     <p:set>
                                       <p:cBhvr>
-                                        <p:cTn id="43" dur="1" fill="hold">
+                                        <p:cTn id="48" dur="1" fill="hold">
                                           <p:stCondLst>
                                             <p:cond delay="0"/>
                                           </p:stCondLst>
@@ -29857,7 +30659,7 @@
                                     </p:set>
                                     <p:animEffect transition="in" filter="fade">
                                       <p:cBhvr>
-                                        <p:cTn id="44" dur="300"/>
+                                        <p:cTn id="49" dur="300"/>
                                         <p:tgtEl>
                                           <p:spTgt spid="29"/>
                                         </p:tgtEl>
@@ -29873,26 +30675,26 @@
                     </p:cTn>
                   </p:par>
                   <p:par>
-                    <p:cTn id="45" fill="hold">
+                    <p:cTn id="50" fill="hold">
                       <p:stCondLst>
                         <p:cond delay="indefinite"/>
                       </p:stCondLst>
                       <p:childTnLst>
                         <p:par>
-                          <p:cTn id="46" fill="hold">
+                          <p:cTn id="51" fill="hold">
                             <p:stCondLst>
                               <p:cond delay="0"/>
                             </p:stCondLst>
                             <p:childTnLst>
                               <p:par>
-                                <p:cTn id="47" presetID="10" presetClass="entr" presetSubtype="0" fill="hold" nodeType="clickEffect">
+                                <p:cTn id="52" presetID="10" presetClass="entr" presetSubtype="0" fill="hold" nodeType="clickEffect">
                                   <p:stCondLst>
                                     <p:cond delay="0"/>
                                   </p:stCondLst>
                                   <p:childTnLst>
                                     <p:set>
                                       <p:cBhvr>
-                                        <p:cTn id="48" dur="1" fill="hold">
+                                        <p:cTn id="53" dur="1" fill="hold">
                                           <p:stCondLst>
                                             <p:cond delay="0"/>
                                           </p:stCondLst>
@@ -29910,7 +30712,7 @@
                                     </p:set>
                                     <p:animEffect transition="in" filter="fade">
                                       <p:cBhvr>
-                                        <p:cTn id="49" dur="300"/>
+                                        <p:cTn id="54" dur="300"/>
                                         <p:tgtEl>
                                           <p:spTgt spid="69"/>
                                         </p:tgtEl>
@@ -29920,14 +30722,14 @@
                                 </p:cTn>
                               </p:par>
                               <p:par>
-                                <p:cTn id="50" presetID="10" presetClass="entr" presetSubtype="0" fill="hold" nodeType="withEffect">
+                                <p:cTn id="55" presetID="10" presetClass="entr" presetSubtype="0" fill="hold" nodeType="withEffect">
                                   <p:stCondLst>
                                     <p:cond delay="0"/>
                                   </p:stCondLst>
                                   <p:childTnLst>
                                     <p:set>
                                       <p:cBhvr>
-                                        <p:cTn id="51" dur="1" fill="hold">
+                                        <p:cTn id="56" dur="1" fill="hold">
                                           <p:stCondLst>
                                             <p:cond delay="0"/>
                                           </p:stCondLst>
@@ -29945,7 +30747,7 @@
                                     </p:set>
                                     <p:animEffect transition="in" filter="fade">
                                       <p:cBhvr>
-                                        <p:cTn id="52" dur="300"/>
+                                        <p:cTn id="57" dur="300"/>
                                         <p:tgtEl>
                                           <p:spTgt spid="64"/>
                                         </p:tgtEl>
@@ -29955,14 +30757,14 @@
                                 </p:cTn>
                               </p:par>
                               <p:par>
-                                <p:cTn id="53" presetID="10" presetClass="entr" presetSubtype="0" fill="hold" nodeType="withEffect">
+                                <p:cTn id="58" presetID="10" presetClass="entr" presetSubtype="0" fill="hold" nodeType="withEffect">
                                   <p:stCondLst>
                                     <p:cond delay="0"/>
                                   </p:stCondLst>
                                   <p:childTnLst>
                                     <p:set>
                                       <p:cBhvr>
-                                        <p:cTn id="54" dur="1" fill="hold">
+                                        <p:cTn id="59" dur="1" fill="hold">
                                           <p:stCondLst>
                                             <p:cond delay="0"/>
                                           </p:stCondLst>
@@ -29980,7 +30782,7 @@
                                     </p:set>
                                     <p:animEffect transition="in" filter="fade">
                                       <p:cBhvr>
-                                        <p:cTn id="55" dur="300"/>
+                                        <p:cTn id="60" dur="300"/>
                                         <p:tgtEl>
                                           <p:spTgt spid="65"/>
                                         </p:tgtEl>
@@ -29990,14 +30792,14 @@
                                 </p:cTn>
                               </p:par>
                               <p:par>
-                                <p:cTn id="56" presetID="10" presetClass="entr" presetSubtype="0" fill="hold" nodeType="withEffect">
+                                <p:cTn id="61" presetID="10" presetClass="entr" presetSubtype="0" fill="hold" nodeType="withEffect">
                                   <p:stCondLst>
                                     <p:cond delay="0"/>
                                   </p:stCondLst>
                                   <p:childTnLst>
                                     <p:set>
                                       <p:cBhvr>
-                                        <p:cTn id="57" dur="1" fill="hold">
+                                        <p:cTn id="62" dur="1" fill="hold">
                                           <p:stCondLst>
                                             <p:cond delay="0"/>
                                           </p:stCondLst>
@@ -30015,7 +30817,7 @@
                                     </p:set>
                                     <p:animEffect transition="in" filter="fade">
                                       <p:cBhvr>
-                                        <p:cTn id="58" dur="300"/>
+                                        <p:cTn id="63" dur="300"/>
                                         <p:tgtEl>
                                           <p:spTgt spid="66"/>
                                         </p:tgtEl>
@@ -30025,14 +30827,14 @@
                                 </p:cTn>
                               </p:par>
                               <p:par>
-                                <p:cTn id="59" presetID="10" presetClass="entr" presetSubtype="0" fill="hold" nodeType="withEffect">
+                                <p:cTn id="64" presetID="10" presetClass="entr" presetSubtype="0" fill="hold" nodeType="withEffect">
                                   <p:stCondLst>
                                     <p:cond delay="0"/>
                                   </p:stCondLst>
                                   <p:childTnLst>
                                     <p:set>
                                       <p:cBhvr>
-                                        <p:cTn id="60" dur="1" fill="hold">
+                                        <p:cTn id="65" dur="1" fill="hold">
                                           <p:stCondLst>
                                             <p:cond delay="0"/>
                                           </p:stCondLst>
@@ -30050,7 +30852,7 @@
                                     </p:set>
                                     <p:animEffect transition="in" filter="fade">
                                       <p:cBhvr>
-                                        <p:cTn id="61" dur="300"/>
+                                        <p:cTn id="66" dur="300"/>
                                         <p:tgtEl>
                                           <p:spTgt spid="67"/>
                                         </p:tgtEl>
@@ -30060,14 +30862,14 @@
                                 </p:cTn>
                               </p:par>
                               <p:par>
-                                <p:cTn id="62" presetID="10" presetClass="entr" presetSubtype="0" fill="hold" nodeType="withEffect">
+                                <p:cTn id="67" presetID="10" presetClass="entr" presetSubtype="0" fill="hold" nodeType="withEffect">
                                   <p:stCondLst>
                                     <p:cond delay="0"/>
                                   </p:stCondLst>
                                   <p:childTnLst>
                                     <p:set>
                                       <p:cBhvr>
-                                        <p:cTn id="63" dur="1" fill="hold">
+                                        <p:cTn id="68" dur="1" fill="hold">
                                           <p:stCondLst>
                                             <p:cond delay="0"/>
                                           </p:stCondLst>
@@ -30085,7 +30887,7 @@
                                     </p:set>
                                     <p:animEffect transition="in" filter="fade">
                                       <p:cBhvr>
-                                        <p:cTn id="64" dur="300"/>
+                                        <p:cTn id="69" dur="300"/>
                                         <p:tgtEl>
                                           <p:spTgt spid="34"/>
                                         </p:tgtEl>
@@ -30095,14 +30897,14 @@
                                 </p:cTn>
                               </p:par>
                               <p:par>
-                                <p:cTn id="65" presetID="10" presetClass="entr" presetSubtype="0" fill="hold" nodeType="withEffect">
+                                <p:cTn id="70" presetID="10" presetClass="entr" presetSubtype="0" fill="hold" nodeType="withEffect">
                                   <p:stCondLst>
                                     <p:cond delay="0"/>
                                   </p:stCondLst>
                                   <p:childTnLst>
                                     <p:set>
                                       <p:cBhvr>
-                                        <p:cTn id="66" dur="1" fill="hold">
+                                        <p:cTn id="71" dur="1" fill="hold">
                                           <p:stCondLst>
                                             <p:cond delay="0"/>
                                           </p:stCondLst>
@@ -30120,7 +30922,7 @@
                                     </p:set>
                                     <p:animEffect transition="in" filter="fade">
                                       <p:cBhvr>
-                                        <p:cTn id="67" dur="300"/>
+                                        <p:cTn id="72" dur="300"/>
                                         <p:tgtEl>
                                           <p:spTgt spid="68"/>
                                         </p:tgtEl>
@@ -30130,14 +30932,14 @@
                                 </p:cTn>
                               </p:par>
                               <p:par>
-                                <p:cTn id="68" presetID="10" presetClass="entr" presetSubtype="0" fill="hold" nodeType="withEffect">
+                                <p:cTn id="73" presetID="10" presetClass="entr" presetSubtype="0" fill="hold" nodeType="withEffect">
                                   <p:stCondLst>
                                     <p:cond delay="0"/>
                                   </p:stCondLst>
                                   <p:childTnLst>
                                     <p:set>
                                       <p:cBhvr>
-                                        <p:cTn id="69" dur="1" fill="hold">
+                                        <p:cTn id="74" dur="1" fill="hold">
                                           <p:stCondLst>
                                             <p:cond delay="0"/>
                                           </p:stCondLst>
@@ -30155,62 +30957,9 @@
                                     </p:set>
                                     <p:animEffect transition="in" filter="fade">
                                       <p:cBhvr>
-                                        <p:cTn id="70" dur="300"/>
+                                        <p:cTn id="75" dur="300"/>
                                         <p:tgtEl>
                                           <p:spTgt spid="71"/>
-                                        </p:tgtEl>
-                                      </p:cBhvr>
-                                    </p:animEffect>
-                                  </p:childTnLst>
-                                </p:cTn>
-                              </p:par>
-                            </p:childTnLst>
-                          </p:cTn>
-                        </p:par>
-                      </p:childTnLst>
-                    </p:cTn>
-                  </p:par>
-                  <p:par>
-                    <p:cTn id="71" fill="hold">
-                      <p:stCondLst>
-                        <p:cond delay="indefinite"/>
-                      </p:stCondLst>
-                      <p:childTnLst>
-                        <p:par>
-                          <p:cTn id="72" fill="hold">
-                            <p:stCondLst>
-                              <p:cond delay="0"/>
-                            </p:stCondLst>
-                            <p:childTnLst>
-                              <p:par>
-                                <p:cTn id="73" presetID="22" presetClass="entr" presetSubtype="8" fill="hold" nodeType="clickEffect">
-                                  <p:stCondLst>
-                                    <p:cond delay="0"/>
-                                  </p:stCondLst>
-                                  <p:childTnLst>
-                                    <p:set>
-                                      <p:cBhvr>
-                                        <p:cTn id="74" dur="1" fill="hold">
-                                          <p:stCondLst>
-                                            <p:cond delay="0"/>
-                                          </p:stCondLst>
-                                        </p:cTn>
-                                        <p:tgtEl>
-                                          <p:spTgt spid="85"/>
-                                        </p:tgtEl>
-                                        <p:attrNameLst>
-                                          <p:attrName>style.visibility</p:attrName>
-                                        </p:attrNameLst>
-                                      </p:cBhvr>
-                                      <p:to>
-                                        <p:strVal val="visible"/>
-                                      </p:to>
-                                    </p:set>
-                                    <p:animEffect transition="in" filter="wipe(left)">
-                                      <p:cBhvr>
-                                        <p:cTn id="75" dur="300"/>
-                                        <p:tgtEl>
-                                          <p:spTgt spid="85"/>
                                         </p:tgtEl>
                                       </p:cBhvr>
                                     </p:animEffect>
@@ -30236,7 +30985,7 @@
                             </p:stCondLst>
                             <p:childTnLst>
                               <p:par>
-                                <p:cTn id="78" presetID="10" presetClass="entr" presetSubtype="0" fill="hold" nodeType="clickEffect">
+                                <p:cTn id="78" presetID="22" presetClass="entr" presetSubtype="8" fill="hold" nodeType="clickEffect">
                                   <p:stCondLst>
                                     <p:cond delay="0"/>
                                   </p:stCondLst>
@@ -30249,7 +30998,7 @@
                                           </p:stCondLst>
                                         </p:cTn>
                                         <p:tgtEl>
-                                          <p:spTgt spid="35"/>
+                                          <p:spTgt spid="85"/>
                                         </p:tgtEl>
                                         <p:attrNameLst>
                                           <p:attrName>style.visibility</p:attrName>
@@ -30259,11 +31008,11 @@
                                         <p:strVal val="visible"/>
                                       </p:to>
                                     </p:set>
-                                    <p:animEffect transition="in" filter="fade">
+                                    <p:animEffect transition="in" filter="wipe(left)">
                                       <p:cBhvr>
                                         <p:cTn id="80" dur="300"/>
                                         <p:tgtEl>
-                                          <p:spTgt spid="35"/>
+                                          <p:spTgt spid="85"/>
                                         </p:tgtEl>
                                       </p:cBhvr>
                                     </p:animEffect>
@@ -30289,7 +31038,7 @@
                             </p:stCondLst>
                             <p:childTnLst>
                               <p:par>
-                                <p:cTn id="83" presetID="10" presetClass="entr" presetSubtype="0" fill="hold" grpId="0" nodeType="clickEffect">
+                                <p:cTn id="83" presetID="10" presetClass="entr" presetSubtype="0" fill="hold" nodeType="clickEffect">
                                   <p:stCondLst>
                                     <p:cond delay="0"/>
                                   </p:stCondLst>
@@ -30302,7 +31051,7 @@
                                           </p:stCondLst>
                                         </p:cTn>
                                         <p:tgtEl>
-                                          <p:spTgt spid="37"/>
+                                          <p:spTgt spid="35"/>
                                         </p:tgtEl>
                                         <p:attrNameLst>
                                           <p:attrName>style.visibility</p:attrName>
@@ -30316,7 +31065,7 @@
                                       <p:cBhvr>
                                         <p:cTn id="85" dur="300"/>
                                         <p:tgtEl>
-                                          <p:spTgt spid="37"/>
+                                          <p:spTgt spid="35"/>
                                         </p:tgtEl>
                                       </p:cBhvr>
                                     </p:animEffect>
@@ -30342,7 +31091,7 @@
                             </p:stCondLst>
                             <p:childTnLst>
                               <p:par>
-                                <p:cTn id="88" presetID="10" presetClass="entr" presetSubtype="0" fill="hold" nodeType="clickEffect">
+                                <p:cTn id="88" presetID="10" presetClass="entr" presetSubtype="0" fill="hold" grpId="0" nodeType="clickEffect">
                                   <p:stCondLst>
                                     <p:cond delay="0"/>
                                   </p:stCondLst>
@@ -30355,7 +31104,7 @@
                                           </p:stCondLst>
                                         </p:cTn>
                                         <p:tgtEl>
-                                          <p:spTgt spid="39"/>
+                                          <p:spTgt spid="37"/>
                                         </p:tgtEl>
                                         <p:attrNameLst>
                                           <p:attrName>style.visibility</p:attrName>
@@ -30369,7 +31118,7 @@
                                       <p:cBhvr>
                                         <p:cTn id="90" dur="300"/>
                                         <p:tgtEl>
-                                          <p:spTgt spid="39"/>
+                                          <p:spTgt spid="37"/>
                                         </p:tgtEl>
                                       </p:cBhvr>
                                     </p:animEffect>
@@ -30408,7 +31157,7 @@
                                           </p:stCondLst>
                                         </p:cTn>
                                         <p:tgtEl>
-                                          <p:spTgt spid="76"/>
+                                          <p:spTgt spid="39"/>
                                         </p:tgtEl>
                                         <p:attrNameLst>
                                           <p:attrName>style.visibility</p:attrName>
@@ -30422,7 +31171,7 @@
                                       <p:cBhvr>
                                         <p:cTn id="95" dur="300"/>
                                         <p:tgtEl>
-                                          <p:spTgt spid="76"/>
+                                          <p:spTgt spid="39"/>
                                         </p:tgtEl>
                                       </p:cBhvr>
                                     </p:animEffect>
@@ -30448,7 +31197,7 @@
                             </p:stCondLst>
                             <p:childTnLst>
                               <p:par>
-                                <p:cTn id="98" presetID="22" presetClass="entr" presetSubtype="8" fill="hold" nodeType="clickEffect">
+                                <p:cTn id="98" presetID="10" presetClass="entr" presetSubtype="0" fill="hold" nodeType="clickEffect">
                                   <p:stCondLst>
                                     <p:cond delay="0"/>
                                   </p:stCondLst>
@@ -30461,7 +31210,7 @@
                                           </p:stCondLst>
                                         </p:cTn>
                                         <p:tgtEl>
-                                          <p:spTgt spid="94"/>
+                                          <p:spTgt spid="76"/>
                                         </p:tgtEl>
                                         <p:attrNameLst>
                                           <p:attrName>style.visibility</p:attrName>
@@ -30471,11 +31220,11 @@
                                         <p:strVal val="visible"/>
                                       </p:to>
                                     </p:set>
-                                    <p:animEffect transition="in" filter="wipe(left)">
+                                    <p:animEffect transition="in" filter="fade">
                                       <p:cBhvr>
                                         <p:cTn id="100" dur="300"/>
                                         <p:tgtEl>
-                                          <p:spTgt spid="94"/>
+                                          <p:spTgt spid="76"/>
                                         </p:tgtEl>
                                       </p:cBhvr>
                                     </p:animEffect>
@@ -30501,7 +31250,7 @@
                             </p:stCondLst>
                             <p:childTnLst>
                               <p:par>
-                                <p:cTn id="103" presetID="10" presetClass="entr" presetSubtype="0" fill="hold" nodeType="clickEffect">
+                                <p:cTn id="103" presetID="22" presetClass="entr" presetSubtype="8" fill="hold" nodeType="clickEffect">
                                   <p:stCondLst>
                                     <p:cond delay="0"/>
                                   </p:stCondLst>
@@ -30514,7 +31263,7 @@
                                           </p:stCondLst>
                                         </p:cTn>
                                         <p:tgtEl>
-                                          <p:spTgt spid="96"/>
+                                          <p:spTgt spid="94"/>
                                         </p:tgtEl>
                                         <p:attrNameLst>
                                           <p:attrName>style.visibility</p:attrName>
@@ -30524,11 +31273,11 @@
                                         <p:strVal val="visible"/>
                                       </p:to>
                                     </p:set>
-                                    <p:animEffect transition="in" filter="fade">
+                                    <p:animEffect transition="in" filter="wipe(left)">
                                       <p:cBhvr>
                                         <p:cTn id="105" dur="300"/>
                                         <p:tgtEl>
-                                          <p:spTgt spid="96"/>
+                                          <p:spTgt spid="94"/>
                                         </p:tgtEl>
                                       </p:cBhvr>
                                     </p:animEffect>
@@ -30567,7 +31316,7 @@
                                           </p:stCondLst>
                                         </p:cTn>
                                         <p:tgtEl>
-                                          <p:spTgt spid="103"/>
+                                          <p:spTgt spid="96"/>
                                         </p:tgtEl>
                                         <p:attrNameLst>
                                           <p:attrName>style.visibility</p:attrName>
@@ -30581,7 +31330,7 @@
                                       <p:cBhvr>
                                         <p:cTn id="110" dur="300"/>
                                         <p:tgtEl>
-                                          <p:spTgt spid="103"/>
+                                          <p:spTgt spid="96"/>
                                         </p:tgtEl>
                                       </p:cBhvr>
                                     </p:animEffect>
@@ -30620,7 +31369,7 @@
                                           </p:stCondLst>
                                         </p:cTn>
                                         <p:tgtEl>
-                                          <p:spTgt spid="97"/>
+                                          <p:spTgt spid="103"/>
                                         </p:tgtEl>
                                         <p:attrNameLst>
                                           <p:attrName>style.visibility</p:attrName>
@@ -30634,6 +31383,59 @@
                                       <p:cBhvr>
                                         <p:cTn id="115" dur="300"/>
                                         <p:tgtEl>
+                                          <p:spTgt spid="103"/>
+                                        </p:tgtEl>
+                                      </p:cBhvr>
+                                    </p:animEffect>
+                                  </p:childTnLst>
+                                </p:cTn>
+                              </p:par>
+                            </p:childTnLst>
+                          </p:cTn>
+                        </p:par>
+                      </p:childTnLst>
+                    </p:cTn>
+                  </p:par>
+                  <p:par>
+                    <p:cTn id="116" fill="hold">
+                      <p:stCondLst>
+                        <p:cond delay="indefinite"/>
+                      </p:stCondLst>
+                      <p:childTnLst>
+                        <p:par>
+                          <p:cTn id="117" fill="hold">
+                            <p:stCondLst>
+                              <p:cond delay="0"/>
+                            </p:stCondLst>
+                            <p:childTnLst>
+                              <p:par>
+                                <p:cTn id="118" presetID="10" presetClass="entr" presetSubtype="0" fill="hold" nodeType="clickEffect">
+                                  <p:stCondLst>
+                                    <p:cond delay="0"/>
+                                  </p:stCondLst>
+                                  <p:childTnLst>
+                                    <p:set>
+                                      <p:cBhvr>
+                                        <p:cTn id="119" dur="1" fill="hold">
+                                          <p:stCondLst>
+                                            <p:cond delay="0"/>
+                                          </p:stCondLst>
+                                        </p:cTn>
+                                        <p:tgtEl>
+                                          <p:spTgt spid="97"/>
+                                        </p:tgtEl>
+                                        <p:attrNameLst>
+                                          <p:attrName>style.visibility</p:attrName>
+                                        </p:attrNameLst>
+                                      </p:cBhvr>
+                                      <p:to>
+                                        <p:strVal val="visible"/>
+                                      </p:to>
+                                    </p:set>
+                                    <p:animEffect transition="in" filter="fade">
+                                      <p:cBhvr>
+                                        <p:cTn id="120" dur="300"/>
+                                        <p:tgtEl>
                                           <p:spTgt spid="97"/>
                                         </p:tgtEl>
                                       </p:cBhvr>
@@ -30642,14 +31444,14 @@
                                 </p:cTn>
                               </p:par>
                               <p:par>
-                                <p:cTn id="116" presetID="10" presetClass="exit" presetSubtype="0" fill="hold" nodeType="withEffect">
+                                <p:cTn id="121" presetID="10" presetClass="exit" presetSubtype="0" fill="hold" nodeType="withEffect">
                                   <p:stCondLst>
                                     <p:cond delay="0"/>
                                   </p:stCondLst>
                                   <p:childTnLst>
                                     <p:animEffect transition="out" filter="fade">
                                       <p:cBhvr>
-                                        <p:cTn id="117" dur="300"/>
+                                        <p:cTn id="122" dur="300"/>
                                         <p:tgtEl>
                                           <p:spTgt spid="103"/>
                                         </p:tgtEl>
@@ -30657,7 +31459,7 @@
                                     </p:animEffect>
                                     <p:set>
                                       <p:cBhvr>
-                                        <p:cTn id="118" dur="1" fill="hold">
+                                        <p:cTn id="123" dur="1" fill="hold">
                                           <p:stCondLst>
                                             <p:cond delay="299"/>
                                           </p:stCondLst>
@@ -30715,6 +31517,7 @@
       <p:bldP spid="70" grpId="0" animBg="1"/>
       <p:bldP spid="73" grpId="0" animBg="1"/>
       <p:bldP spid="100" grpId="0" animBg="1"/>
+      <p:bldP spid="75" grpId="0" animBg="1"/>
     </p:bldLst>
   </p:timing>
 </p:sld>
@@ -33348,6 +34151,56 @@
           </a:p>
         </p:txBody>
       </p:sp>
+      <p:sp>
+        <p:nvSpPr>
+          <p:cNvPr id="73" name="직사각형 72">
+            <a:extLst>
+              <a:ext uri="{FF2B5EF4-FFF2-40B4-BE49-F238E27FC236}">
+                <a16:creationId xmlns:a16="http://schemas.microsoft.com/office/drawing/2014/main" id="{8E17D4AB-013E-48D8-A505-6C79DCD90940}"/>
+              </a:ext>
+            </a:extLst>
+          </p:cNvPr>
+          <p:cNvSpPr/>
+          <p:nvPr/>
+        </p:nvSpPr>
+        <p:spPr>
+          <a:xfrm>
+            <a:off x="11702234" y="830997"/>
+            <a:ext cx="268093" cy="149764"/>
+          </a:xfrm>
+          <a:prstGeom prst="rect">
+            <a:avLst/>
+          </a:prstGeom>
+          <a:noFill/>
+          <a:ln>
+            <a:noFill/>
+          </a:ln>
+        </p:spPr>
+        <p:style>
+          <a:lnRef idx="2">
+            <a:schemeClr val="accent1">
+              <a:shade val="50000"/>
+            </a:schemeClr>
+          </a:lnRef>
+          <a:fillRef idx="1">
+            <a:schemeClr val="accent1"/>
+          </a:fillRef>
+          <a:effectRef idx="0">
+            <a:schemeClr val="accent1"/>
+          </a:effectRef>
+          <a:fontRef idx="minor">
+            <a:schemeClr val="lt1"/>
+          </a:fontRef>
+        </p:style>
+        <p:txBody>
+          <a:bodyPr rtlCol="0" anchor="ctr"/>
+          <a:lstStyle/>
+          <a:p>
+            <a:pPr algn="ctr"/>
+            <a:endParaRPr lang="ko-KR" altLang="en-US"/>
+          </a:p>
+        </p:txBody>
+      </p:sp>
     </p:spTree>
     <p:extLst>
       <p:ext uri="{BB962C8B-B14F-4D97-AF65-F5344CB8AC3E}">
@@ -33358,6 +34211,92 @@
   <p:clrMapOvr>
     <a:masterClrMapping/>
   </p:clrMapOvr>
+  <p:timing>
+    <p:tnLst>
+      <p:par>
+        <p:cTn id="1" dur="indefinite" restart="never" nodeType="tmRoot">
+          <p:childTnLst>
+            <p:seq concurrent="1" nextAc="seek">
+              <p:cTn id="2" dur="indefinite" nodeType="mainSeq">
+                <p:childTnLst>
+                  <p:par>
+                    <p:cTn id="3" fill="hold">
+                      <p:stCondLst>
+                        <p:cond delay="indefinite"/>
+                      </p:stCondLst>
+                      <p:childTnLst>
+                        <p:par>
+                          <p:cTn id="4" fill="hold">
+                            <p:stCondLst>
+                              <p:cond delay="0"/>
+                            </p:stCondLst>
+                            <p:childTnLst>
+                              <p:par>
+                                <p:cTn id="5" presetID="10" presetClass="entr" presetSubtype="0" fill="hold" grpId="0" nodeType="clickEffect">
+                                  <p:stCondLst>
+                                    <p:cond delay="0"/>
+                                  </p:stCondLst>
+                                  <p:childTnLst>
+                                    <p:set>
+                                      <p:cBhvr>
+                                        <p:cTn id="6" dur="1" fill="hold">
+                                          <p:stCondLst>
+                                            <p:cond delay="0"/>
+                                          </p:stCondLst>
+                                        </p:cTn>
+                                        <p:tgtEl>
+                                          <p:spTgt spid="73"/>
+                                        </p:tgtEl>
+                                        <p:attrNameLst>
+                                          <p:attrName>style.visibility</p:attrName>
+                                        </p:attrNameLst>
+                                      </p:cBhvr>
+                                      <p:to>
+                                        <p:strVal val="visible"/>
+                                      </p:to>
+                                    </p:set>
+                                    <p:animEffect transition="in" filter="fade">
+                                      <p:cBhvr>
+                                        <p:cTn id="7" dur="1000"/>
+                                        <p:tgtEl>
+                                          <p:spTgt spid="73"/>
+                                        </p:tgtEl>
+                                      </p:cBhvr>
+                                    </p:animEffect>
+                                  </p:childTnLst>
+                                </p:cTn>
+                              </p:par>
+                            </p:childTnLst>
+                          </p:cTn>
+                        </p:par>
+                      </p:childTnLst>
+                    </p:cTn>
+                  </p:par>
+                </p:childTnLst>
+              </p:cTn>
+              <p:prevCondLst>
+                <p:cond evt="onPrev" delay="0">
+                  <p:tgtEl>
+                    <p:sldTgt/>
+                  </p:tgtEl>
+                </p:cond>
+              </p:prevCondLst>
+              <p:nextCondLst>
+                <p:cond evt="onNext" delay="0">
+                  <p:tgtEl>
+                    <p:sldTgt/>
+                  </p:tgtEl>
+                </p:cond>
+              </p:nextCondLst>
+            </p:seq>
+          </p:childTnLst>
+        </p:cTn>
+      </p:par>
+    </p:tnLst>
+    <p:bldLst>
+      <p:bldP spid="73" grpId="0" animBg="1"/>
+    </p:bldLst>
+  </p:timing>
 </p:sld>
 </file>
 
@@ -37275,6 +38214,56 @@
           </a:p>
         </p:txBody>
       </p:sp>
+      <p:sp>
+        <p:nvSpPr>
+          <p:cNvPr id="102" name="직사각형 101">
+            <a:extLst>
+              <a:ext uri="{FF2B5EF4-FFF2-40B4-BE49-F238E27FC236}">
+                <a16:creationId xmlns:a16="http://schemas.microsoft.com/office/drawing/2014/main" id="{5CE4D5C4-11D0-4DD5-B5F0-10DFECABA0EC}"/>
+              </a:ext>
+            </a:extLst>
+          </p:cNvPr>
+          <p:cNvSpPr/>
+          <p:nvPr/>
+        </p:nvSpPr>
+        <p:spPr>
+          <a:xfrm>
+            <a:off x="11702234" y="830997"/>
+            <a:ext cx="268093" cy="149764"/>
+          </a:xfrm>
+          <a:prstGeom prst="rect">
+            <a:avLst/>
+          </a:prstGeom>
+          <a:noFill/>
+          <a:ln>
+            <a:noFill/>
+          </a:ln>
+        </p:spPr>
+        <p:style>
+          <a:lnRef idx="2">
+            <a:schemeClr val="accent1">
+              <a:shade val="50000"/>
+            </a:schemeClr>
+          </a:lnRef>
+          <a:fillRef idx="1">
+            <a:schemeClr val="accent1"/>
+          </a:fillRef>
+          <a:effectRef idx="0">
+            <a:schemeClr val="accent1"/>
+          </a:effectRef>
+          <a:fontRef idx="minor">
+            <a:schemeClr val="lt1"/>
+          </a:fontRef>
+        </p:style>
+        <p:txBody>
+          <a:bodyPr rtlCol="0" anchor="ctr"/>
+          <a:lstStyle/>
+          <a:p>
+            <a:pPr algn="ctr"/>
+            <a:endParaRPr lang="ko-KR" altLang="en-US"/>
+          </a:p>
+        </p:txBody>
+      </p:sp>
     </p:spTree>
     <p:extLst>
       <p:ext uri="{BB962C8B-B14F-4D97-AF65-F5344CB8AC3E}">
@@ -37285,6 +38274,92 @@
   <p:clrMapOvr>
     <a:masterClrMapping/>
   </p:clrMapOvr>
+  <p:timing>
+    <p:tnLst>
+      <p:par>
+        <p:cTn id="1" dur="indefinite" restart="never" nodeType="tmRoot">
+          <p:childTnLst>
+            <p:seq concurrent="1" nextAc="seek">
+              <p:cTn id="2" dur="indefinite" nodeType="mainSeq">
+                <p:childTnLst>
+                  <p:par>
+                    <p:cTn id="3" fill="hold">
+                      <p:stCondLst>
+                        <p:cond delay="indefinite"/>
+                      </p:stCondLst>
+                      <p:childTnLst>
+                        <p:par>
+                          <p:cTn id="4" fill="hold">
+                            <p:stCondLst>
+                              <p:cond delay="0"/>
+                            </p:stCondLst>
+                            <p:childTnLst>
+                              <p:par>
+                                <p:cTn id="5" presetID="10" presetClass="entr" presetSubtype="0" fill="hold" grpId="0" nodeType="clickEffect">
+                                  <p:stCondLst>
+                                    <p:cond delay="0"/>
+                                  </p:stCondLst>
+                                  <p:childTnLst>
+                                    <p:set>
+                                      <p:cBhvr>
+                                        <p:cTn id="6" dur="1" fill="hold">
+                                          <p:stCondLst>
+                                            <p:cond delay="0"/>
+                                          </p:stCondLst>
+                                        </p:cTn>
+                                        <p:tgtEl>
+                                          <p:spTgt spid="102"/>
+                                        </p:tgtEl>
+                                        <p:attrNameLst>
+                                          <p:attrName>style.visibility</p:attrName>
+                                        </p:attrNameLst>
+                                      </p:cBhvr>
+                                      <p:to>
+                                        <p:strVal val="visible"/>
+                                      </p:to>
+                                    </p:set>
+                                    <p:animEffect transition="in" filter="fade">
+                                      <p:cBhvr>
+                                        <p:cTn id="7" dur="1000"/>
+                                        <p:tgtEl>
+                                          <p:spTgt spid="102"/>
+                                        </p:tgtEl>
+                                      </p:cBhvr>
+                                    </p:animEffect>
+                                  </p:childTnLst>
+                                </p:cTn>
+                              </p:par>
+                            </p:childTnLst>
+                          </p:cTn>
+                        </p:par>
+                      </p:childTnLst>
+                    </p:cTn>
+                  </p:par>
+                </p:childTnLst>
+              </p:cTn>
+              <p:prevCondLst>
+                <p:cond evt="onPrev" delay="0">
+                  <p:tgtEl>
+                    <p:sldTgt/>
+                  </p:tgtEl>
+                </p:cond>
+              </p:prevCondLst>
+              <p:nextCondLst>
+                <p:cond evt="onNext" delay="0">
+                  <p:tgtEl>
+                    <p:sldTgt/>
+                  </p:tgtEl>
+                </p:cond>
+              </p:nextCondLst>
+            </p:seq>
+          </p:childTnLst>
+        </p:cTn>
+      </p:par>
+    </p:tnLst>
+    <p:bldLst>
+      <p:bldP spid="102" grpId="0" animBg="1"/>
+    </p:bldLst>
+  </p:timing>
 </p:sld>
 </file>
 
@@ -38875,6 +39950,56 @@
           </a:p>
         </p:txBody>
       </p:sp>
+      <p:sp>
+        <p:nvSpPr>
+          <p:cNvPr id="23" name="직사각형 22">
+            <a:extLst>
+              <a:ext uri="{FF2B5EF4-FFF2-40B4-BE49-F238E27FC236}">
+                <a16:creationId xmlns:a16="http://schemas.microsoft.com/office/drawing/2014/main" id="{9C591B17-3F79-4F0B-B935-E0201CC34C5A}"/>
+              </a:ext>
+            </a:extLst>
+          </p:cNvPr>
+          <p:cNvSpPr/>
+          <p:nvPr/>
+        </p:nvSpPr>
+        <p:spPr>
+          <a:xfrm>
+            <a:off x="11702234" y="830997"/>
+            <a:ext cx="268093" cy="149764"/>
+          </a:xfrm>
+          <a:prstGeom prst="rect">
+            <a:avLst/>
+          </a:prstGeom>
+          <a:noFill/>
+          <a:ln>
+            <a:noFill/>
+          </a:ln>
+        </p:spPr>
+        <p:style>
+          <a:lnRef idx="2">
+            <a:schemeClr val="accent1">
+              <a:shade val="50000"/>
+            </a:schemeClr>
+          </a:lnRef>
+          <a:fillRef idx="1">
+            <a:schemeClr val="accent1"/>
+          </a:fillRef>
+          <a:effectRef idx="0">
+            <a:schemeClr val="accent1"/>
+          </a:effectRef>
+          <a:fontRef idx="minor">
+            <a:schemeClr val="lt1"/>
+          </a:fontRef>
+        </p:style>
+        <p:txBody>
+          <a:bodyPr rtlCol="0" anchor="ctr"/>
+          <a:lstStyle/>
+          <a:p>
+            <a:pPr algn="ctr"/>
+            <a:endParaRPr lang="ko-KR" altLang="en-US"/>
+          </a:p>
+        </p:txBody>
+      </p:sp>
     </p:spTree>
     <p:extLst>
       <p:ext uri="{BB962C8B-B14F-4D97-AF65-F5344CB8AC3E}">
@@ -38906,14 +40031,67 @@
                             </p:stCondLst>
                             <p:childTnLst>
                               <p:par>
-                                <p:cTn id="5" presetID="10" presetClass="exit" presetSubtype="0" fill="hold" grpId="0" nodeType="clickEffect">
+                                <p:cTn id="5" presetID="10" presetClass="entr" presetSubtype="0" fill="hold" grpId="0" nodeType="clickEffect">
+                                  <p:stCondLst>
+                                    <p:cond delay="0"/>
+                                  </p:stCondLst>
+                                  <p:childTnLst>
+                                    <p:set>
+                                      <p:cBhvr>
+                                        <p:cTn id="6" dur="1" fill="hold">
+                                          <p:stCondLst>
+                                            <p:cond delay="0"/>
+                                          </p:stCondLst>
+                                        </p:cTn>
+                                        <p:tgtEl>
+                                          <p:spTgt spid="23"/>
+                                        </p:tgtEl>
+                                        <p:attrNameLst>
+                                          <p:attrName>style.visibility</p:attrName>
+                                        </p:attrNameLst>
+                                      </p:cBhvr>
+                                      <p:to>
+                                        <p:strVal val="visible"/>
+                                      </p:to>
+                                    </p:set>
+                                    <p:animEffect transition="in" filter="fade">
+                                      <p:cBhvr>
+                                        <p:cTn id="7" dur="1000"/>
+                                        <p:tgtEl>
+                                          <p:spTgt spid="23"/>
+                                        </p:tgtEl>
+                                      </p:cBhvr>
+                                    </p:animEffect>
+                                  </p:childTnLst>
+                                </p:cTn>
+                              </p:par>
+                            </p:childTnLst>
+                          </p:cTn>
+                        </p:par>
+                      </p:childTnLst>
+                    </p:cTn>
+                  </p:par>
+                  <p:par>
+                    <p:cTn id="8" fill="hold">
+                      <p:stCondLst>
+                        <p:cond delay="indefinite"/>
+                      </p:stCondLst>
+                      <p:childTnLst>
+                        <p:par>
+                          <p:cTn id="9" fill="hold">
+                            <p:stCondLst>
+                              <p:cond delay="0"/>
+                            </p:stCondLst>
+                            <p:childTnLst>
+                              <p:par>
+                                <p:cTn id="10" presetID="10" presetClass="exit" presetSubtype="0" fill="hold" grpId="0" nodeType="clickEffect">
                                   <p:stCondLst>
                                     <p:cond delay="0"/>
                                   </p:stCondLst>
                                   <p:childTnLst>
                                     <p:animEffect transition="out" filter="fade">
                                       <p:cBhvr>
-                                        <p:cTn id="6" dur="500"/>
+                                        <p:cTn id="11" dur="500"/>
                                         <p:tgtEl>
                                           <p:spTgt spid="70"/>
                                         </p:tgtEl>
@@ -38921,7 +40099,7 @@
                                     </p:animEffect>
                                     <p:set>
                                       <p:cBhvr>
-                                        <p:cTn id="7" dur="1" fill="hold">
+                                        <p:cTn id="12" dur="1" fill="hold">
                                           <p:stCondLst>
                                             <p:cond delay="499"/>
                                           </p:stCondLst>
@@ -38941,14 +40119,14 @@
                                 </p:cTn>
                               </p:par>
                               <p:par>
-                                <p:cTn id="8" presetID="42" presetClass="path" presetSubtype="0" accel="50000" decel="50000" fill="hold" grpId="1" nodeType="withEffect">
+                                <p:cTn id="13" presetID="42" presetClass="path" presetSubtype="0" accel="50000" decel="50000" fill="hold" grpId="1" nodeType="withEffect">
                                   <p:stCondLst>
                                     <p:cond delay="0"/>
                                   </p:stCondLst>
                                   <p:childTnLst>
                                     <p:animMotion origin="layout" path="M -6.25E-7 -2.22222E-6 L 0.29805 0.29491 " pathEditMode="relative" rAng="0" ptsTypes="AA">
                                       <p:cBhvr>
-                                        <p:cTn id="9" dur="500" fill="hold"/>
+                                        <p:cTn id="14" dur="500" fill="hold"/>
                                         <p:tgtEl>
                                           <p:spTgt spid="70"/>
                                         </p:tgtEl>
@@ -38963,14 +40141,14 @@
                                 </p:cTn>
                               </p:par>
                               <p:par>
-                                <p:cTn id="10" presetID="6" presetClass="emph" presetSubtype="0" fill="hold" grpId="2" nodeType="withEffect">
+                                <p:cTn id="15" presetID="6" presetClass="emph" presetSubtype="0" fill="hold" grpId="2" nodeType="withEffect">
                                   <p:stCondLst>
                                     <p:cond delay="0"/>
                                   </p:stCondLst>
                                   <p:childTnLst>
                                     <p:animScale>
                                       <p:cBhvr>
-                                        <p:cTn id="11" dur="500" fill="hold"/>
+                                        <p:cTn id="16" dur="500" fill="hold"/>
                                         <p:tgtEl>
                                           <p:spTgt spid="70"/>
                                         </p:tgtEl>
@@ -38981,14 +40159,14 @@
                                 </p:cTn>
                               </p:par>
                               <p:par>
-                                <p:cTn id="12" presetID="10" presetClass="entr" presetSubtype="0" fill="hold" grpId="0" nodeType="withEffect">
+                                <p:cTn id="17" presetID="10" presetClass="entr" presetSubtype="0" fill="hold" grpId="0" nodeType="withEffect">
                                   <p:stCondLst>
                                     <p:cond delay="250"/>
                                   </p:stCondLst>
                                   <p:childTnLst>
                                     <p:set>
                                       <p:cBhvr>
-                                        <p:cTn id="13" dur="1" fill="hold">
+                                        <p:cTn id="18" dur="1" fill="hold">
                                           <p:stCondLst>
                                             <p:cond delay="0"/>
                                           </p:stCondLst>
@@ -39006,7 +40184,7 @@
                                     </p:set>
                                     <p:animEffect transition="in" filter="fade">
                                       <p:cBhvr>
-                                        <p:cTn id="14" dur="200"/>
+                                        <p:cTn id="19" dur="200"/>
                                         <p:tgtEl>
                                           <p:spTgt spid="69"/>
                                         </p:tgtEl>
@@ -39047,6 +40225,7 @@
       <p:bldP spid="70" grpId="0" animBg="1"/>
       <p:bldP spid="70" grpId="1" animBg="1"/>
       <p:bldP spid="70" grpId="2" animBg="1"/>
+      <p:bldP spid="23" grpId="0" animBg="1"/>
     </p:bldLst>
   </p:timing>
 </p:sld>
@@ -39301,6 +40480,56 @@
           </a:extLst>
         </p:spPr>
       </p:pic>
+      <p:sp>
+        <p:nvSpPr>
+          <p:cNvPr id="6" name="직사각형 5">
+            <a:extLst>
+              <a:ext uri="{FF2B5EF4-FFF2-40B4-BE49-F238E27FC236}">
+                <a16:creationId xmlns:a16="http://schemas.microsoft.com/office/drawing/2014/main" id="{9467F52C-FF34-43D4-B082-5AE1D739B437}"/>
+              </a:ext>
+            </a:extLst>
+          </p:cNvPr>
+          <p:cNvSpPr/>
+          <p:nvPr/>
+        </p:nvSpPr>
+        <p:spPr>
+          <a:xfrm>
+            <a:off x="11702234" y="830997"/>
+            <a:ext cx="268093" cy="149764"/>
+          </a:xfrm>
+          <a:prstGeom prst="rect">
+            <a:avLst/>
+          </a:prstGeom>
+          <a:noFill/>
+          <a:ln>
+            <a:noFill/>
+          </a:ln>
+        </p:spPr>
+        <p:style>
+          <a:lnRef idx="2">
+            <a:schemeClr val="accent1">
+              <a:shade val="50000"/>
+            </a:schemeClr>
+          </a:lnRef>
+          <a:fillRef idx="1">
+            <a:schemeClr val="accent1"/>
+          </a:fillRef>
+          <a:effectRef idx="0">
+            <a:schemeClr val="accent1"/>
+          </a:effectRef>
+          <a:fontRef idx="minor">
+            <a:schemeClr val="lt1"/>
+          </a:fontRef>
+        </p:style>
+        <p:txBody>
+          <a:bodyPr rtlCol="0" anchor="ctr"/>
+          <a:lstStyle/>
+          <a:p>
+            <a:pPr algn="ctr"/>
+            <a:endParaRPr lang="ko-KR" altLang="en-US"/>
+          </a:p>
+        </p:txBody>
+      </p:sp>
     </p:spTree>
     <p:extLst>
       <p:ext uri="{BB962C8B-B14F-4D97-AF65-F5344CB8AC3E}">
@@ -39311,6 +40540,92 @@
   <p:clrMapOvr>
     <a:masterClrMapping/>
   </p:clrMapOvr>
+  <p:timing>
+    <p:tnLst>
+      <p:par>
+        <p:cTn id="1" dur="indefinite" restart="never" nodeType="tmRoot">
+          <p:childTnLst>
+            <p:seq concurrent="1" nextAc="seek">
+              <p:cTn id="2" dur="indefinite" nodeType="mainSeq">
+                <p:childTnLst>
+                  <p:par>
+                    <p:cTn id="3" fill="hold">
+                      <p:stCondLst>
+                        <p:cond delay="indefinite"/>
+                      </p:stCondLst>
+                      <p:childTnLst>
+                        <p:par>
+                          <p:cTn id="4" fill="hold">
+                            <p:stCondLst>
+                              <p:cond delay="0"/>
+                            </p:stCondLst>
+                            <p:childTnLst>
+                              <p:par>
+                                <p:cTn id="5" presetID="10" presetClass="entr" presetSubtype="0" fill="hold" grpId="0" nodeType="clickEffect">
+                                  <p:stCondLst>
+                                    <p:cond delay="0"/>
+                                  </p:stCondLst>
+                                  <p:childTnLst>
+                                    <p:set>
+                                      <p:cBhvr>
+                                        <p:cTn id="6" dur="1" fill="hold">
+                                          <p:stCondLst>
+                                            <p:cond delay="0"/>
+                                          </p:stCondLst>
+                                        </p:cTn>
+                                        <p:tgtEl>
+                                          <p:spTgt spid="6"/>
+                                        </p:tgtEl>
+                                        <p:attrNameLst>
+                                          <p:attrName>style.visibility</p:attrName>
+                                        </p:attrNameLst>
+                                      </p:cBhvr>
+                                      <p:to>
+                                        <p:strVal val="visible"/>
+                                      </p:to>
+                                    </p:set>
+                                    <p:animEffect transition="in" filter="fade">
+                                      <p:cBhvr>
+                                        <p:cTn id="7" dur="1000"/>
+                                        <p:tgtEl>
+                                          <p:spTgt spid="6"/>
+                                        </p:tgtEl>
+                                      </p:cBhvr>
+                                    </p:animEffect>
+                                  </p:childTnLst>
+                                </p:cTn>
+                              </p:par>
+                            </p:childTnLst>
+                          </p:cTn>
+                        </p:par>
+                      </p:childTnLst>
+                    </p:cTn>
+                  </p:par>
+                </p:childTnLst>
+              </p:cTn>
+              <p:prevCondLst>
+                <p:cond evt="onPrev" delay="0">
+                  <p:tgtEl>
+                    <p:sldTgt/>
+                  </p:tgtEl>
+                </p:cond>
+              </p:prevCondLst>
+              <p:nextCondLst>
+                <p:cond evt="onNext" delay="0">
+                  <p:tgtEl>
+                    <p:sldTgt/>
+                  </p:tgtEl>
+                </p:cond>
+              </p:nextCondLst>
+            </p:seq>
+          </p:childTnLst>
+        </p:cTn>
+      </p:par>
+    </p:tnLst>
+    <p:bldLst>
+      <p:bldP spid="6" grpId="0" animBg="1"/>
+    </p:bldLst>
+  </p:timing>
 </p:sld>
 </file>
 

</xml_diff>